<commit_message>
Subindo modelo conceitual e ajustes no minimundo
</commit_message>
<xml_diff>
--- a/5 Slides/apresentacao.pptx
+++ b/5 Slides/apresentacao.pptx
@@ -1,31 +1,20 @@
 
 <file path=ppt/presentation.xml><?xml version="1.0" encoding="utf-8"?>
-<p:presentation xmlns:a="http://schemas.openxmlformats.org/drawingml/2006/main" xmlns:r="http://schemas.openxmlformats.org/officeDocument/2006/relationships" xmlns:p="http://schemas.openxmlformats.org/presentationml/2006/main" saveSubsetFonts="1" embedTrueTypeFonts="true">
+<p:presentation xmlns:a="http://schemas.openxmlformats.org/drawingml/2006/main" xmlns:r="http://schemas.openxmlformats.org/officeDocument/2006/relationships" xmlns:p="http://schemas.openxmlformats.org/presentationml/2006/main" saveSubsetFonts="1">
   <p:sldMasterIdLst>
     <p:sldMasterId id="2147483648" r:id="rId1"/>
   </p:sldMasterIdLst>
   <p:sldIdLst>
-    <p:sldId id="256" r:id="rId6"/>
-    <p:sldId id="257" r:id="rId7"/>
-    <p:sldId id="258" r:id="rId8"/>
-    <p:sldId id="259" r:id="rId9"/>
-    <p:sldId id="260" r:id="rId10"/>
+    <p:sldId id="256" r:id="rId2"/>
+    <p:sldId id="257" r:id="rId3"/>
+    <p:sldId id="258" r:id="rId4"/>
+    <p:sldId id="259" r:id="rId5"/>
   </p:sldIdLst>
-  <p:sldSz cx="18288000" cy="10287000"/>
+  <p:sldSz cx="12192000" cy="6858000"/>
   <p:notesSz cx="6858000" cy="9144000"/>
-  <p:embeddedFontLst>
-    <p:embeddedFont>
-      <p:font typeface="Now Bold" charset="1" panose="00000800000000000000"/>
-      <p:regular r:id="rId11"/>
-    </p:embeddedFont>
-    <p:embeddedFont>
-      <p:font typeface="Now" charset="1" panose="00000500000000000000"/>
-      <p:regular r:id="rId12"/>
-    </p:embeddedFont>
-  </p:embeddedFontLst>
   <p:defaultTextStyle>
     <a:defPPr>
-      <a:defRPr lang="en-US"/>
+      <a:defRPr lang="pt-BR"/>
     </a:defPPr>
     <a:lvl1pPr marL="0" algn="l" defTabSz="914400" rtl="0" eaLnBrk="1" latinLnBrk="0" hangingPunct="1">
       <a:defRPr sz="1800" kern="1200">
@@ -140,7 +129,13 @@
       </p:grpSpPr>
       <p:sp>
         <p:nvSpPr>
-          <p:cNvPr id="2" name="Title 1"/>
+          <p:cNvPr id="2" name="Title 1">
+            <a:extLst>
+              <a:ext uri="{FF2B5EF4-FFF2-40B4-BE49-F238E27FC236}">
+                <a16:creationId xmlns:a16="http://schemas.microsoft.com/office/drawing/2014/main" id="{D9C986F9-847C-DCB7-7A95-10D0C0C957F3}"/>
+              </a:ext>
+            </a:extLst>
+          </p:cNvPr>
           <p:cNvSpPr>
             <a:spLocks noGrp="1"/>
           </p:cNvSpPr>
@@ -150,25 +145,35 @@
         </p:nvSpPr>
         <p:spPr>
           <a:xfrm>
-            <a:off x="685800" y="2130425"/>
-            <a:ext cx="7772400" cy="1470025"/>
+            <a:off x="1524000" y="1122363"/>
+            <a:ext cx="9144000" cy="2387600"/>
           </a:xfrm>
         </p:spPr>
         <p:txBody>
-          <a:bodyPr/>
-          <a:lstStyle/>
-          <a:p>
-            <a:r>
-              <a:rPr lang="en-US" smtClean="0"/>
+          <a:bodyPr anchor="b"/>
+          <a:lstStyle>
+            <a:lvl1pPr algn="ctr">
+              <a:defRPr sz="6000"/>
+            </a:lvl1pPr>
+          </a:lstStyle>
+          <a:p>
+            <a:r>
+              <a:rPr lang="en-US"/>
               <a:t>Click to edit Master title style</a:t>
             </a:r>
-            <a:endParaRPr lang="en-US"/>
-          </a:p>
-        </p:txBody>
-      </p:sp>
-      <p:sp>
-        <p:nvSpPr>
-          <p:cNvPr id="3" name="Subtitle 2"/>
+            <a:endParaRPr lang="pt-BR"/>
+          </a:p>
+        </p:txBody>
+      </p:sp>
+      <p:sp>
+        <p:nvSpPr>
+          <p:cNvPr id="3" name="Subtitle 2">
+            <a:extLst>
+              <a:ext uri="{FF2B5EF4-FFF2-40B4-BE49-F238E27FC236}">
+                <a16:creationId xmlns:a16="http://schemas.microsoft.com/office/drawing/2014/main" id="{5BC8063F-DBB1-7E57-65E1-9B6822DD926C}"/>
+              </a:ext>
+            </a:extLst>
+          </p:cNvPr>
           <p:cNvSpPr>
             <a:spLocks noGrp="1"/>
           </p:cNvSpPr>
@@ -178,8 +183,8 @@
         </p:nvSpPr>
         <p:spPr>
           <a:xfrm>
-            <a:off x="1371600" y="3886200"/>
-            <a:ext cx="6400800" cy="1752600"/>
+            <a:off x="1524000" y="3602038"/>
+            <a:ext cx="9144000" cy="1655762"/>
           </a:xfrm>
         </p:spPr>
         <p:txBody>
@@ -187,107 +192,59 @@
           <a:lstStyle>
             <a:lvl1pPr marL="0" indent="0" algn="ctr">
               <a:buNone/>
-              <a:defRPr>
-                <a:solidFill>
-                  <a:schemeClr val="tx1">
-                    <a:tint val="75000"/>
-                  </a:schemeClr>
-                </a:solidFill>
-              </a:defRPr>
+              <a:defRPr sz="2400"/>
             </a:lvl1pPr>
             <a:lvl2pPr marL="457200" indent="0" algn="ctr">
               <a:buNone/>
-              <a:defRPr>
-                <a:solidFill>
-                  <a:schemeClr val="tx1">
-                    <a:tint val="75000"/>
-                  </a:schemeClr>
-                </a:solidFill>
-              </a:defRPr>
+              <a:defRPr sz="2000"/>
             </a:lvl2pPr>
             <a:lvl3pPr marL="914400" indent="0" algn="ctr">
               <a:buNone/>
-              <a:defRPr>
-                <a:solidFill>
-                  <a:schemeClr val="tx1">
-                    <a:tint val="75000"/>
-                  </a:schemeClr>
-                </a:solidFill>
-              </a:defRPr>
+              <a:defRPr sz="1800"/>
             </a:lvl3pPr>
             <a:lvl4pPr marL="1371600" indent="0" algn="ctr">
               <a:buNone/>
-              <a:defRPr>
-                <a:solidFill>
-                  <a:schemeClr val="tx1">
-                    <a:tint val="75000"/>
-                  </a:schemeClr>
-                </a:solidFill>
-              </a:defRPr>
+              <a:defRPr sz="1600"/>
             </a:lvl4pPr>
             <a:lvl5pPr marL="1828800" indent="0" algn="ctr">
               <a:buNone/>
-              <a:defRPr>
-                <a:solidFill>
-                  <a:schemeClr val="tx1">
-                    <a:tint val="75000"/>
-                  </a:schemeClr>
-                </a:solidFill>
-              </a:defRPr>
+              <a:defRPr sz="1600"/>
             </a:lvl5pPr>
             <a:lvl6pPr marL="2286000" indent="0" algn="ctr">
               <a:buNone/>
-              <a:defRPr>
-                <a:solidFill>
-                  <a:schemeClr val="tx1">
-                    <a:tint val="75000"/>
-                  </a:schemeClr>
-                </a:solidFill>
-              </a:defRPr>
+              <a:defRPr sz="1600"/>
             </a:lvl6pPr>
             <a:lvl7pPr marL="2743200" indent="0" algn="ctr">
               <a:buNone/>
-              <a:defRPr>
-                <a:solidFill>
-                  <a:schemeClr val="tx1">
-                    <a:tint val="75000"/>
-                  </a:schemeClr>
-                </a:solidFill>
-              </a:defRPr>
+              <a:defRPr sz="1600"/>
             </a:lvl7pPr>
             <a:lvl8pPr marL="3200400" indent="0" algn="ctr">
               <a:buNone/>
-              <a:defRPr>
-                <a:solidFill>
-                  <a:schemeClr val="tx1">
-                    <a:tint val="75000"/>
-                  </a:schemeClr>
-                </a:solidFill>
-              </a:defRPr>
+              <a:defRPr sz="1600"/>
             </a:lvl8pPr>
             <a:lvl9pPr marL="3657600" indent="0" algn="ctr">
               <a:buNone/>
-              <a:defRPr>
-                <a:solidFill>
-                  <a:schemeClr val="tx1">
-                    <a:tint val="75000"/>
-                  </a:schemeClr>
-                </a:solidFill>
-              </a:defRPr>
+              <a:defRPr sz="1600"/>
             </a:lvl9pPr>
           </a:lstStyle>
           <a:p>
             <a:r>
-              <a:rPr lang="en-US" smtClean="0"/>
+              <a:rPr lang="en-US"/>
               <a:t>Click to edit Master subtitle style</a:t>
             </a:r>
-            <a:endParaRPr lang="en-US"/>
-          </a:p>
-        </p:txBody>
-      </p:sp>
-      <p:sp>
-        <p:nvSpPr>
-          <p:cNvPr id="4" name="Date Placeholder 3"/>
+            <a:endParaRPr lang="pt-BR"/>
+          </a:p>
+        </p:txBody>
+      </p:sp>
+      <p:sp>
+        <p:nvSpPr>
+          <p:cNvPr id="4" name="Date Placeholder 3">
+            <a:extLst>
+              <a:ext uri="{FF2B5EF4-FFF2-40B4-BE49-F238E27FC236}">
+                <a16:creationId xmlns:a16="http://schemas.microsoft.com/office/drawing/2014/main" id="{DDA40E07-5EA2-B2D8-16E1-BED48A118E78}"/>
+              </a:ext>
+            </a:extLst>
+          </p:cNvPr>
           <p:cNvSpPr>
             <a:spLocks noGrp="1"/>
           </p:cNvSpPr>
@@ -300,18 +257,23 @@
           <a:bodyPr/>
           <a:lstStyle/>
           <a:p>
-            <a:fld id="{1D8BD707-D9CF-40AE-B4C6-C98DA3205C09}" type="datetimeFigureOut">
-              <a:rPr lang="en-US" smtClean="0"/>
-              <a:pPr/>
-              <a:t>8/1/2011</a:t>
+            <a:fld id="{8AE7362A-84B1-4B09-A6AA-BD756A087DA6}" type="datetimeFigureOut">
+              <a:rPr lang="pt-BR" smtClean="0"/>
+              <a:t>19/06/2024</a:t>
             </a:fld>
-            <a:endParaRPr lang="en-US"/>
-          </a:p>
-        </p:txBody>
-      </p:sp>
-      <p:sp>
-        <p:nvSpPr>
-          <p:cNvPr id="5" name="Footer Placeholder 4"/>
+            <a:endParaRPr lang="pt-BR"/>
+          </a:p>
+        </p:txBody>
+      </p:sp>
+      <p:sp>
+        <p:nvSpPr>
+          <p:cNvPr id="5" name="Footer Placeholder 4">
+            <a:extLst>
+              <a:ext uri="{FF2B5EF4-FFF2-40B4-BE49-F238E27FC236}">
+                <a16:creationId xmlns:a16="http://schemas.microsoft.com/office/drawing/2014/main" id="{9786EC7C-5C8A-485F-8130-2476F62498A1}"/>
+              </a:ext>
+            </a:extLst>
+          </p:cNvPr>
           <p:cNvSpPr>
             <a:spLocks noGrp="1"/>
           </p:cNvSpPr>
@@ -324,13 +286,19 @@
           <a:bodyPr/>
           <a:lstStyle/>
           <a:p>
-            <a:endParaRPr lang="en-US"/>
-          </a:p>
-        </p:txBody>
-      </p:sp>
-      <p:sp>
-        <p:nvSpPr>
-          <p:cNvPr id="6" name="Slide Number Placeholder 5"/>
+            <a:endParaRPr lang="pt-BR"/>
+          </a:p>
+        </p:txBody>
+      </p:sp>
+      <p:sp>
+        <p:nvSpPr>
+          <p:cNvPr id="6" name="Slide Number Placeholder 5">
+            <a:extLst>
+              <a:ext uri="{FF2B5EF4-FFF2-40B4-BE49-F238E27FC236}">
+                <a16:creationId xmlns:a16="http://schemas.microsoft.com/office/drawing/2014/main" id="{4998C26B-3B97-55E7-FADA-52A01D21F6D3}"/>
+              </a:ext>
+            </a:extLst>
+          </p:cNvPr>
           <p:cNvSpPr>
             <a:spLocks noGrp="1"/>
           </p:cNvSpPr>
@@ -343,16 +311,20 @@
           <a:bodyPr/>
           <a:lstStyle/>
           <a:p>
-            <a:fld id="{B6F15528-21DE-4FAA-801E-634DDDAF4B2B}" type="slidenum">
-              <a:rPr lang="en-US" smtClean="0"/>
-              <a:pPr/>
+            <a:fld id="{4EEAC180-CC41-4733-ADF9-C4B75E732B74}" type="slidenum">
+              <a:rPr lang="pt-BR" smtClean="0"/>
               <a:t>‹#›</a:t>
             </a:fld>
-            <a:endParaRPr lang="en-US"/>
+            <a:endParaRPr lang="pt-BR"/>
           </a:p>
         </p:txBody>
       </p:sp>
     </p:spTree>
+    <p:extLst>
+      <p:ext uri="{BB962C8B-B14F-4D97-AF65-F5344CB8AC3E}">
+        <p14:creationId xmlns:p14="http://schemas.microsoft.com/office/powerpoint/2010/main" val="32409100"/>
+      </p:ext>
+    </p:extLst>
   </p:cSld>
   <p:clrMapOvr>
     <a:masterClrMapping/>
@@ -379,7 +351,13 @@
       </p:grpSpPr>
       <p:sp>
         <p:nvSpPr>
-          <p:cNvPr id="2" name="Title 1"/>
+          <p:cNvPr id="2" name="Title 1">
+            <a:extLst>
+              <a:ext uri="{FF2B5EF4-FFF2-40B4-BE49-F238E27FC236}">
+                <a16:creationId xmlns:a16="http://schemas.microsoft.com/office/drawing/2014/main" id="{BC592C7F-9A69-FD4D-2BAF-3F0A1AB56E12}"/>
+              </a:ext>
+            </a:extLst>
+          </p:cNvPr>
           <p:cNvSpPr>
             <a:spLocks noGrp="1"/>
           </p:cNvSpPr>
@@ -393,16 +371,22 @@
           <a:lstStyle/>
           <a:p>
             <a:r>
-              <a:rPr lang="en-US" smtClean="0"/>
+              <a:rPr lang="en-US"/>
               <a:t>Click to edit Master title style</a:t>
             </a:r>
-            <a:endParaRPr lang="en-US"/>
-          </a:p>
-        </p:txBody>
-      </p:sp>
-      <p:sp>
-        <p:nvSpPr>
-          <p:cNvPr id="3" name="Vertical Text Placeholder 2"/>
+            <a:endParaRPr lang="pt-BR"/>
+          </a:p>
+        </p:txBody>
+      </p:sp>
+      <p:sp>
+        <p:nvSpPr>
+          <p:cNvPr id="3" name="Vertical Text Placeholder 2">
+            <a:extLst>
+              <a:ext uri="{FF2B5EF4-FFF2-40B4-BE49-F238E27FC236}">
+                <a16:creationId xmlns:a16="http://schemas.microsoft.com/office/drawing/2014/main" id="{B8639E5D-3E6F-562F-F32E-208A7148DC33}"/>
+              </a:ext>
+            </a:extLst>
+          </p:cNvPr>
           <p:cNvSpPr>
             <a:spLocks noGrp="1"/>
           </p:cNvSpPr>
@@ -417,44 +401,50 @@
           <a:p>
             <a:pPr lvl="0"/>
             <a:r>
-              <a:rPr lang="en-US" smtClean="0"/>
+              <a:rPr lang="en-US"/>
               <a:t>Click to edit Master text styles</a:t>
             </a:r>
           </a:p>
           <a:p>
             <a:pPr lvl="1"/>
             <a:r>
-              <a:rPr lang="en-US" smtClean="0"/>
+              <a:rPr lang="en-US"/>
               <a:t>Second level</a:t>
             </a:r>
           </a:p>
           <a:p>
             <a:pPr lvl="2"/>
             <a:r>
-              <a:rPr lang="en-US" smtClean="0"/>
+              <a:rPr lang="en-US"/>
               <a:t>Third level</a:t>
             </a:r>
           </a:p>
           <a:p>
             <a:pPr lvl="3"/>
             <a:r>
-              <a:rPr lang="en-US" smtClean="0"/>
+              <a:rPr lang="en-US"/>
               <a:t>Fourth level</a:t>
             </a:r>
           </a:p>
           <a:p>
             <a:pPr lvl="4"/>
             <a:r>
-              <a:rPr lang="en-US" smtClean="0"/>
+              <a:rPr lang="en-US"/>
               <a:t>Fifth level</a:t>
             </a:r>
-            <a:endParaRPr lang="en-US"/>
-          </a:p>
-        </p:txBody>
-      </p:sp>
-      <p:sp>
-        <p:nvSpPr>
-          <p:cNvPr id="4" name="Date Placeholder 3"/>
+            <a:endParaRPr lang="pt-BR"/>
+          </a:p>
+        </p:txBody>
+      </p:sp>
+      <p:sp>
+        <p:nvSpPr>
+          <p:cNvPr id="4" name="Date Placeholder 3">
+            <a:extLst>
+              <a:ext uri="{FF2B5EF4-FFF2-40B4-BE49-F238E27FC236}">
+                <a16:creationId xmlns:a16="http://schemas.microsoft.com/office/drawing/2014/main" id="{856274A1-7E37-64F9-4EF8-163A0AAA1755}"/>
+              </a:ext>
+            </a:extLst>
+          </p:cNvPr>
           <p:cNvSpPr>
             <a:spLocks noGrp="1"/>
           </p:cNvSpPr>
@@ -467,18 +457,23 @@
           <a:bodyPr/>
           <a:lstStyle/>
           <a:p>
-            <a:fld id="{1D8BD707-D9CF-40AE-B4C6-C98DA3205C09}" type="datetimeFigureOut">
-              <a:rPr lang="en-US" smtClean="0"/>
-              <a:pPr/>
-              <a:t>8/1/2011</a:t>
+            <a:fld id="{8AE7362A-84B1-4B09-A6AA-BD756A087DA6}" type="datetimeFigureOut">
+              <a:rPr lang="pt-BR" smtClean="0"/>
+              <a:t>19/06/2024</a:t>
             </a:fld>
-            <a:endParaRPr lang="en-US"/>
-          </a:p>
-        </p:txBody>
-      </p:sp>
-      <p:sp>
-        <p:nvSpPr>
-          <p:cNvPr id="5" name="Footer Placeholder 4"/>
+            <a:endParaRPr lang="pt-BR"/>
+          </a:p>
+        </p:txBody>
+      </p:sp>
+      <p:sp>
+        <p:nvSpPr>
+          <p:cNvPr id="5" name="Footer Placeholder 4">
+            <a:extLst>
+              <a:ext uri="{FF2B5EF4-FFF2-40B4-BE49-F238E27FC236}">
+                <a16:creationId xmlns:a16="http://schemas.microsoft.com/office/drawing/2014/main" id="{F03366DC-3E9F-6D35-F2C2-6B4AEE36B768}"/>
+              </a:ext>
+            </a:extLst>
+          </p:cNvPr>
           <p:cNvSpPr>
             <a:spLocks noGrp="1"/>
           </p:cNvSpPr>
@@ -491,13 +486,19 @@
           <a:bodyPr/>
           <a:lstStyle/>
           <a:p>
-            <a:endParaRPr lang="en-US"/>
-          </a:p>
-        </p:txBody>
-      </p:sp>
-      <p:sp>
-        <p:nvSpPr>
-          <p:cNvPr id="6" name="Slide Number Placeholder 5"/>
+            <a:endParaRPr lang="pt-BR"/>
+          </a:p>
+        </p:txBody>
+      </p:sp>
+      <p:sp>
+        <p:nvSpPr>
+          <p:cNvPr id="6" name="Slide Number Placeholder 5">
+            <a:extLst>
+              <a:ext uri="{FF2B5EF4-FFF2-40B4-BE49-F238E27FC236}">
+                <a16:creationId xmlns:a16="http://schemas.microsoft.com/office/drawing/2014/main" id="{81F6D3FD-1612-04D9-1887-8DD506667907}"/>
+              </a:ext>
+            </a:extLst>
+          </p:cNvPr>
           <p:cNvSpPr>
             <a:spLocks noGrp="1"/>
           </p:cNvSpPr>
@@ -510,16 +511,20 @@
           <a:bodyPr/>
           <a:lstStyle/>
           <a:p>
-            <a:fld id="{B6F15528-21DE-4FAA-801E-634DDDAF4B2B}" type="slidenum">
-              <a:rPr lang="en-US" smtClean="0"/>
-              <a:pPr/>
+            <a:fld id="{4EEAC180-CC41-4733-ADF9-C4B75E732B74}" type="slidenum">
+              <a:rPr lang="pt-BR" smtClean="0"/>
               <a:t>‹#›</a:t>
             </a:fld>
-            <a:endParaRPr lang="en-US"/>
+            <a:endParaRPr lang="pt-BR"/>
           </a:p>
         </p:txBody>
       </p:sp>
     </p:spTree>
+    <p:extLst>
+      <p:ext uri="{BB962C8B-B14F-4D97-AF65-F5344CB8AC3E}">
+        <p14:creationId xmlns:p14="http://schemas.microsoft.com/office/powerpoint/2010/main" val="1920165996"/>
+      </p:ext>
+    </p:extLst>
   </p:cSld>
   <p:clrMapOvr>
     <a:masterClrMapping/>
@@ -546,7 +551,13 @@
       </p:grpSpPr>
       <p:sp>
         <p:nvSpPr>
-          <p:cNvPr id="2" name="Vertical Title 1"/>
+          <p:cNvPr id="2" name="Vertical Title 1">
+            <a:extLst>
+              <a:ext uri="{FF2B5EF4-FFF2-40B4-BE49-F238E27FC236}">
+                <a16:creationId xmlns:a16="http://schemas.microsoft.com/office/drawing/2014/main" id="{333C8A69-C4FE-07FD-9BB5-CD7C5DCCE258}"/>
+              </a:ext>
+            </a:extLst>
+          </p:cNvPr>
           <p:cNvSpPr>
             <a:spLocks noGrp="1"/>
           </p:cNvSpPr>
@@ -556,8 +567,8 @@
         </p:nvSpPr>
         <p:spPr>
           <a:xfrm>
-            <a:off x="6629400" y="274638"/>
-            <a:ext cx="2057400" cy="5851525"/>
+            <a:off x="8724900" y="365125"/>
+            <a:ext cx="2628900" cy="5811838"/>
           </a:xfrm>
         </p:spPr>
         <p:txBody>
@@ -565,16 +576,22 @@
           <a:lstStyle/>
           <a:p>
             <a:r>
-              <a:rPr lang="en-US" smtClean="0"/>
+              <a:rPr lang="en-US"/>
               <a:t>Click to edit Master title style</a:t>
             </a:r>
-            <a:endParaRPr lang="en-US"/>
-          </a:p>
-        </p:txBody>
-      </p:sp>
-      <p:sp>
-        <p:nvSpPr>
-          <p:cNvPr id="3" name="Vertical Text Placeholder 2"/>
+            <a:endParaRPr lang="pt-BR"/>
+          </a:p>
+        </p:txBody>
+      </p:sp>
+      <p:sp>
+        <p:nvSpPr>
+          <p:cNvPr id="3" name="Vertical Text Placeholder 2">
+            <a:extLst>
+              <a:ext uri="{FF2B5EF4-FFF2-40B4-BE49-F238E27FC236}">
+                <a16:creationId xmlns:a16="http://schemas.microsoft.com/office/drawing/2014/main" id="{D698AC2C-592F-B682-51F4-827540B02868}"/>
+              </a:ext>
+            </a:extLst>
+          </p:cNvPr>
           <p:cNvSpPr>
             <a:spLocks noGrp="1"/>
           </p:cNvSpPr>
@@ -584,8 +601,8 @@
         </p:nvSpPr>
         <p:spPr>
           <a:xfrm>
-            <a:off x="457200" y="274638"/>
-            <a:ext cx="6019800" cy="5851525"/>
+            <a:off x="838200" y="365125"/>
+            <a:ext cx="7734300" cy="5811838"/>
           </a:xfrm>
         </p:spPr>
         <p:txBody>
@@ -594,44 +611,50 @@
           <a:p>
             <a:pPr lvl="0"/>
             <a:r>
-              <a:rPr lang="en-US" smtClean="0"/>
+              <a:rPr lang="en-US"/>
               <a:t>Click to edit Master text styles</a:t>
             </a:r>
           </a:p>
           <a:p>
             <a:pPr lvl="1"/>
             <a:r>
-              <a:rPr lang="en-US" smtClean="0"/>
+              <a:rPr lang="en-US"/>
               <a:t>Second level</a:t>
             </a:r>
           </a:p>
           <a:p>
             <a:pPr lvl="2"/>
             <a:r>
-              <a:rPr lang="en-US" smtClean="0"/>
+              <a:rPr lang="en-US"/>
               <a:t>Third level</a:t>
             </a:r>
           </a:p>
           <a:p>
             <a:pPr lvl="3"/>
             <a:r>
-              <a:rPr lang="en-US" smtClean="0"/>
+              <a:rPr lang="en-US"/>
               <a:t>Fourth level</a:t>
             </a:r>
           </a:p>
           <a:p>
             <a:pPr lvl="4"/>
             <a:r>
-              <a:rPr lang="en-US" smtClean="0"/>
+              <a:rPr lang="en-US"/>
               <a:t>Fifth level</a:t>
             </a:r>
-            <a:endParaRPr lang="en-US"/>
-          </a:p>
-        </p:txBody>
-      </p:sp>
-      <p:sp>
-        <p:nvSpPr>
-          <p:cNvPr id="4" name="Date Placeholder 3"/>
+            <a:endParaRPr lang="pt-BR"/>
+          </a:p>
+        </p:txBody>
+      </p:sp>
+      <p:sp>
+        <p:nvSpPr>
+          <p:cNvPr id="4" name="Date Placeholder 3">
+            <a:extLst>
+              <a:ext uri="{FF2B5EF4-FFF2-40B4-BE49-F238E27FC236}">
+                <a16:creationId xmlns:a16="http://schemas.microsoft.com/office/drawing/2014/main" id="{D58CB563-5598-1ABD-B398-2D4D16800BBD}"/>
+              </a:ext>
+            </a:extLst>
+          </p:cNvPr>
           <p:cNvSpPr>
             <a:spLocks noGrp="1"/>
           </p:cNvSpPr>
@@ -644,18 +667,23 @@
           <a:bodyPr/>
           <a:lstStyle/>
           <a:p>
-            <a:fld id="{1D8BD707-D9CF-40AE-B4C6-C98DA3205C09}" type="datetimeFigureOut">
-              <a:rPr lang="en-US" smtClean="0"/>
-              <a:pPr/>
-              <a:t>8/1/2011</a:t>
+            <a:fld id="{8AE7362A-84B1-4B09-A6AA-BD756A087DA6}" type="datetimeFigureOut">
+              <a:rPr lang="pt-BR" smtClean="0"/>
+              <a:t>19/06/2024</a:t>
             </a:fld>
-            <a:endParaRPr lang="en-US"/>
-          </a:p>
-        </p:txBody>
-      </p:sp>
-      <p:sp>
-        <p:nvSpPr>
-          <p:cNvPr id="5" name="Footer Placeholder 4"/>
+            <a:endParaRPr lang="pt-BR"/>
+          </a:p>
+        </p:txBody>
+      </p:sp>
+      <p:sp>
+        <p:nvSpPr>
+          <p:cNvPr id="5" name="Footer Placeholder 4">
+            <a:extLst>
+              <a:ext uri="{FF2B5EF4-FFF2-40B4-BE49-F238E27FC236}">
+                <a16:creationId xmlns:a16="http://schemas.microsoft.com/office/drawing/2014/main" id="{AF4FDA44-DFC5-1D87-74E4-66DD928E13FE}"/>
+              </a:ext>
+            </a:extLst>
+          </p:cNvPr>
           <p:cNvSpPr>
             <a:spLocks noGrp="1"/>
           </p:cNvSpPr>
@@ -668,13 +696,19 @@
           <a:bodyPr/>
           <a:lstStyle/>
           <a:p>
-            <a:endParaRPr lang="en-US"/>
-          </a:p>
-        </p:txBody>
-      </p:sp>
-      <p:sp>
-        <p:nvSpPr>
-          <p:cNvPr id="6" name="Slide Number Placeholder 5"/>
+            <a:endParaRPr lang="pt-BR"/>
+          </a:p>
+        </p:txBody>
+      </p:sp>
+      <p:sp>
+        <p:nvSpPr>
+          <p:cNvPr id="6" name="Slide Number Placeholder 5">
+            <a:extLst>
+              <a:ext uri="{FF2B5EF4-FFF2-40B4-BE49-F238E27FC236}">
+                <a16:creationId xmlns:a16="http://schemas.microsoft.com/office/drawing/2014/main" id="{D0144997-8977-C4A7-DE11-0A9175574C5A}"/>
+              </a:ext>
+            </a:extLst>
+          </p:cNvPr>
           <p:cNvSpPr>
             <a:spLocks noGrp="1"/>
           </p:cNvSpPr>
@@ -687,16 +721,20 @@
           <a:bodyPr/>
           <a:lstStyle/>
           <a:p>
-            <a:fld id="{B6F15528-21DE-4FAA-801E-634DDDAF4B2B}" type="slidenum">
-              <a:rPr lang="en-US" smtClean="0"/>
-              <a:pPr/>
+            <a:fld id="{4EEAC180-CC41-4733-ADF9-C4B75E732B74}" type="slidenum">
+              <a:rPr lang="pt-BR" smtClean="0"/>
               <a:t>‹#›</a:t>
             </a:fld>
-            <a:endParaRPr lang="en-US"/>
+            <a:endParaRPr lang="pt-BR"/>
           </a:p>
         </p:txBody>
       </p:sp>
     </p:spTree>
+    <p:extLst>
+      <p:ext uri="{BB962C8B-B14F-4D97-AF65-F5344CB8AC3E}">
+        <p14:creationId xmlns:p14="http://schemas.microsoft.com/office/powerpoint/2010/main" val="1776885812"/>
+      </p:ext>
+    </p:extLst>
   </p:cSld>
   <p:clrMapOvr>
     <a:masterClrMapping/>
@@ -723,7 +761,13 @@
       </p:grpSpPr>
       <p:sp>
         <p:nvSpPr>
-          <p:cNvPr id="2" name="Title 1"/>
+          <p:cNvPr id="2" name="Title 1">
+            <a:extLst>
+              <a:ext uri="{FF2B5EF4-FFF2-40B4-BE49-F238E27FC236}">
+                <a16:creationId xmlns:a16="http://schemas.microsoft.com/office/drawing/2014/main" id="{70E5D73F-F4D5-EDCF-DB82-D4F52212B4B4}"/>
+              </a:ext>
+            </a:extLst>
+          </p:cNvPr>
           <p:cNvSpPr>
             <a:spLocks noGrp="1"/>
           </p:cNvSpPr>
@@ -737,16 +781,22 @@
           <a:lstStyle/>
           <a:p>
             <a:r>
-              <a:rPr lang="en-US" smtClean="0"/>
+              <a:rPr lang="en-US"/>
               <a:t>Click to edit Master title style</a:t>
             </a:r>
-            <a:endParaRPr lang="en-US"/>
-          </a:p>
-        </p:txBody>
-      </p:sp>
-      <p:sp>
-        <p:nvSpPr>
-          <p:cNvPr id="3" name="Content Placeholder 2"/>
+            <a:endParaRPr lang="pt-BR"/>
+          </a:p>
+        </p:txBody>
+      </p:sp>
+      <p:sp>
+        <p:nvSpPr>
+          <p:cNvPr id="3" name="Content Placeholder 2">
+            <a:extLst>
+              <a:ext uri="{FF2B5EF4-FFF2-40B4-BE49-F238E27FC236}">
+                <a16:creationId xmlns:a16="http://schemas.microsoft.com/office/drawing/2014/main" id="{8847B91C-B475-2AED-5109-6E9D24E883D2}"/>
+              </a:ext>
+            </a:extLst>
+          </p:cNvPr>
           <p:cNvSpPr>
             <a:spLocks noGrp="1"/>
           </p:cNvSpPr>
@@ -761,44 +811,50 @@
           <a:p>
             <a:pPr lvl="0"/>
             <a:r>
-              <a:rPr lang="en-US" smtClean="0"/>
+              <a:rPr lang="en-US"/>
               <a:t>Click to edit Master text styles</a:t>
             </a:r>
           </a:p>
           <a:p>
             <a:pPr lvl="1"/>
             <a:r>
-              <a:rPr lang="en-US" smtClean="0"/>
+              <a:rPr lang="en-US"/>
               <a:t>Second level</a:t>
             </a:r>
           </a:p>
           <a:p>
             <a:pPr lvl="2"/>
             <a:r>
-              <a:rPr lang="en-US" smtClean="0"/>
+              <a:rPr lang="en-US"/>
               <a:t>Third level</a:t>
             </a:r>
           </a:p>
           <a:p>
             <a:pPr lvl="3"/>
             <a:r>
-              <a:rPr lang="en-US" smtClean="0"/>
+              <a:rPr lang="en-US"/>
               <a:t>Fourth level</a:t>
             </a:r>
           </a:p>
           <a:p>
             <a:pPr lvl="4"/>
             <a:r>
-              <a:rPr lang="en-US" smtClean="0"/>
+              <a:rPr lang="en-US"/>
               <a:t>Fifth level</a:t>
             </a:r>
-            <a:endParaRPr lang="en-US"/>
-          </a:p>
-        </p:txBody>
-      </p:sp>
-      <p:sp>
-        <p:nvSpPr>
-          <p:cNvPr id="4" name="Date Placeholder 3"/>
+            <a:endParaRPr lang="pt-BR"/>
+          </a:p>
+        </p:txBody>
+      </p:sp>
+      <p:sp>
+        <p:nvSpPr>
+          <p:cNvPr id="4" name="Date Placeholder 3">
+            <a:extLst>
+              <a:ext uri="{FF2B5EF4-FFF2-40B4-BE49-F238E27FC236}">
+                <a16:creationId xmlns:a16="http://schemas.microsoft.com/office/drawing/2014/main" id="{5A1A20B4-FEB5-F679-C1F4-D08B2DC15368}"/>
+              </a:ext>
+            </a:extLst>
+          </p:cNvPr>
           <p:cNvSpPr>
             <a:spLocks noGrp="1"/>
           </p:cNvSpPr>
@@ -811,18 +867,23 @@
           <a:bodyPr/>
           <a:lstStyle/>
           <a:p>
-            <a:fld id="{1D8BD707-D9CF-40AE-B4C6-C98DA3205C09}" type="datetimeFigureOut">
-              <a:rPr lang="en-US" smtClean="0"/>
-              <a:pPr/>
-              <a:t>8/1/2011</a:t>
+            <a:fld id="{8AE7362A-84B1-4B09-A6AA-BD756A087DA6}" type="datetimeFigureOut">
+              <a:rPr lang="pt-BR" smtClean="0"/>
+              <a:t>19/06/2024</a:t>
             </a:fld>
-            <a:endParaRPr lang="en-US"/>
-          </a:p>
-        </p:txBody>
-      </p:sp>
-      <p:sp>
-        <p:nvSpPr>
-          <p:cNvPr id="5" name="Footer Placeholder 4"/>
+            <a:endParaRPr lang="pt-BR"/>
+          </a:p>
+        </p:txBody>
+      </p:sp>
+      <p:sp>
+        <p:nvSpPr>
+          <p:cNvPr id="5" name="Footer Placeholder 4">
+            <a:extLst>
+              <a:ext uri="{FF2B5EF4-FFF2-40B4-BE49-F238E27FC236}">
+                <a16:creationId xmlns:a16="http://schemas.microsoft.com/office/drawing/2014/main" id="{0B731EDB-6FA9-FD45-0EFD-75B77C4F5753}"/>
+              </a:ext>
+            </a:extLst>
+          </p:cNvPr>
           <p:cNvSpPr>
             <a:spLocks noGrp="1"/>
           </p:cNvSpPr>
@@ -835,13 +896,19 @@
           <a:bodyPr/>
           <a:lstStyle/>
           <a:p>
-            <a:endParaRPr lang="en-US"/>
-          </a:p>
-        </p:txBody>
-      </p:sp>
-      <p:sp>
-        <p:nvSpPr>
-          <p:cNvPr id="6" name="Slide Number Placeholder 5"/>
+            <a:endParaRPr lang="pt-BR"/>
+          </a:p>
+        </p:txBody>
+      </p:sp>
+      <p:sp>
+        <p:nvSpPr>
+          <p:cNvPr id="6" name="Slide Number Placeholder 5">
+            <a:extLst>
+              <a:ext uri="{FF2B5EF4-FFF2-40B4-BE49-F238E27FC236}">
+                <a16:creationId xmlns:a16="http://schemas.microsoft.com/office/drawing/2014/main" id="{C0CF760E-B7CF-E06B-CC73-CF7BA771F88D}"/>
+              </a:ext>
+            </a:extLst>
+          </p:cNvPr>
           <p:cNvSpPr>
             <a:spLocks noGrp="1"/>
           </p:cNvSpPr>
@@ -854,16 +921,20 @@
           <a:bodyPr/>
           <a:lstStyle/>
           <a:p>
-            <a:fld id="{B6F15528-21DE-4FAA-801E-634DDDAF4B2B}" type="slidenum">
-              <a:rPr lang="en-US" smtClean="0"/>
-              <a:pPr/>
+            <a:fld id="{4EEAC180-CC41-4733-ADF9-C4B75E732B74}" type="slidenum">
+              <a:rPr lang="pt-BR" smtClean="0"/>
               <a:t>‹#›</a:t>
             </a:fld>
-            <a:endParaRPr lang="en-US"/>
+            <a:endParaRPr lang="pt-BR"/>
           </a:p>
         </p:txBody>
       </p:sp>
     </p:spTree>
+    <p:extLst>
+      <p:ext uri="{BB962C8B-B14F-4D97-AF65-F5344CB8AC3E}">
+        <p14:creationId xmlns:p14="http://schemas.microsoft.com/office/powerpoint/2010/main" val="919764030"/>
+      </p:ext>
+    </p:extLst>
   </p:cSld>
   <p:clrMapOvr>
     <a:masterClrMapping/>
@@ -890,7 +961,13 @@
       </p:grpSpPr>
       <p:sp>
         <p:nvSpPr>
-          <p:cNvPr id="2" name="Title 1"/>
+          <p:cNvPr id="2" name="Title 1">
+            <a:extLst>
+              <a:ext uri="{FF2B5EF4-FFF2-40B4-BE49-F238E27FC236}">
+                <a16:creationId xmlns:a16="http://schemas.microsoft.com/office/drawing/2014/main" id="{6E1B0DA7-5582-F506-5C82-C4211E1C2AA1}"/>
+              </a:ext>
+            </a:extLst>
+          </p:cNvPr>
           <p:cNvSpPr>
             <a:spLocks noGrp="1"/>
           </p:cNvSpPr>
@@ -900,29 +977,35 @@
         </p:nvSpPr>
         <p:spPr>
           <a:xfrm>
-            <a:off x="722313" y="4406900"/>
-            <a:ext cx="7772400" cy="1362075"/>
+            <a:off x="831850" y="1709738"/>
+            <a:ext cx="10515600" cy="2852737"/>
           </a:xfrm>
         </p:spPr>
         <p:txBody>
-          <a:bodyPr anchor="t"/>
+          <a:bodyPr anchor="b"/>
           <a:lstStyle>
-            <a:lvl1pPr algn="l">
-              <a:defRPr sz="4000" b="1" cap="all"/>
+            <a:lvl1pPr>
+              <a:defRPr sz="6000"/>
             </a:lvl1pPr>
           </a:lstStyle>
           <a:p>
             <a:r>
-              <a:rPr lang="en-US" smtClean="0"/>
+              <a:rPr lang="en-US"/>
               <a:t>Click to edit Master title style</a:t>
             </a:r>
-            <a:endParaRPr lang="en-US"/>
-          </a:p>
-        </p:txBody>
-      </p:sp>
-      <p:sp>
-        <p:nvSpPr>
-          <p:cNvPr id="3" name="Text Placeholder 2"/>
+            <a:endParaRPr lang="pt-BR"/>
+          </a:p>
+        </p:txBody>
+      </p:sp>
+      <p:sp>
+        <p:nvSpPr>
+          <p:cNvPr id="3" name="Text Placeholder 2">
+            <a:extLst>
+              <a:ext uri="{FF2B5EF4-FFF2-40B4-BE49-F238E27FC236}">
+                <a16:creationId xmlns:a16="http://schemas.microsoft.com/office/drawing/2014/main" id="{AD982AB7-0FFE-86AF-E40A-C61D21816292}"/>
+              </a:ext>
+            </a:extLst>
+          </p:cNvPr>
           <p:cNvSpPr>
             <a:spLocks noGrp="1"/>
           </p:cNvSpPr>
@@ -932,99 +1015,99 @@
         </p:nvSpPr>
         <p:spPr>
           <a:xfrm>
-            <a:off x="722313" y="2906713"/>
-            <a:ext cx="7772400" cy="1500187"/>
+            <a:off x="831850" y="4589463"/>
+            <a:ext cx="10515600" cy="1500187"/>
           </a:xfrm>
         </p:spPr>
         <p:txBody>
-          <a:bodyPr anchor="b"/>
+          <a:bodyPr/>
           <a:lstStyle>
             <a:lvl1pPr marL="0" indent="0">
               <a:buNone/>
-              <a:defRPr sz="2000">
+              <a:defRPr sz="2400">
                 <a:solidFill>
                   <a:schemeClr val="tx1">
-                    <a:tint val="75000"/>
+                    <a:tint val="82000"/>
                   </a:schemeClr>
                 </a:solidFill>
               </a:defRPr>
             </a:lvl1pPr>
             <a:lvl2pPr marL="457200" indent="0">
               <a:buNone/>
-              <a:defRPr sz="1800">
+              <a:defRPr sz="2000">
                 <a:solidFill>
                   <a:schemeClr val="tx1">
-                    <a:tint val="75000"/>
+                    <a:tint val="82000"/>
                   </a:schemeClr>
                 </a:solidFill>
               </a:defRPr>
             </a:lvl2pPr>
             <a:lvl3pPr marL="914400" indent="0">
               <a:buNone/>
-              <a:defRPr sz="1600">
+              <a:defRPr sz="1800">
                 <a:solidFill>
                   <a:schemeClr val="tx1">
-                    <a:tint val="75000"/>
+                    <a:tint val="82000"/>
                   </a:schemeClr>
                 </a:solidFill>
               </a:defRPr>
             </a:lvl3pPr>
             <a:lvl4pPr marL="1371600" indent="0">
               <a:buNone/>
-              <a:defRPr sz="1400">
+              <a:defRPr sz="1600">
                 <a:solidFill>
                   <a:schemeClr val="tx1">
-                    <a:tint val="75000"/>
+                    <a:tint val="82000"/>
                   </a:schemeClr>
                 </a:solidFill>
               </a:defRPr>
             </a:lvl4pPr>
             <a:lvl5pPr marL="1828800" indent="0">
               <a:buNone/>
-              <a:defRPr sz="1400">
+              <a:defRPr sz="1600">
                 <a:solidFill>
                   <a:schemeClr val="tx1">
-                    <a:tint val="75000"/>
+                    <a:tint val="82000"/>
                   </a:schemeClr>
                 </a:solidFill>
               </a:defRPr>
             </a:lvl5pPr>
             <a:lvl6pPr marL="2286000" indent="0">
               <a:buNone/>
-              <a:defRPr sz="1400">
+              <a:defRPr sz="1600">
                 <a:solidFill>
                   <a:schemeClr val="tx1">
-                    <a:tint val="75000"/>
+                    <a:tint val="82000"/>
                   </a:schemeClr>
                 </a:solidFill>
               </a:defRPr>
             </a:lvl6pPr>
             <a:lvl7pPr marL="2743200" indent="0">
               <a:buNone/>
-              <a:defRPr sz="1400">
+              <a:defRPr sz="1600">
                 <a:solidFill>
                   <a:schemeClr val="tx1">
-                    <a:tint val="75000"/>
+                    <a:tint val="82000"/>
                   </a:schemeClr>
                 </a:solidFill>
               </a:defRPr>
             </a:lvl7pPr>
             <a:lvl8pPr marL="3200400" indent="0">
               <a:buNone/>
-              <a:defRPr sz="1400">
+              <a:defRPr sz="1600">
                 <a:solidFill>
                   <a:schemeClr val="tx1">
-                    <a:tint val="75000"/>
+                    <a:tint val="82000"/>
                   </a:schemeClr>
                 </a:solidFill>
               </a:defRPr>
             </a:lvl8pPr>
             <a:lvl9pPr marL="3657600" indent="0">
               <a:buNone/>
-              <a:defRPr sz="1400">
+              <a:defRPr sz="1600">
                 <a:solidFill>
                   <a:schemeClr val="tx1">
-                    <a:tint val="75000"/>
+                    <a:tint val="82000"/>
                   </a:schemeClr>
                 </a:solidFill>
               </a:defRPr>
@@ -1033,7 +1116,7 @@
           <a:p>
             <a:pPr lvl="0"/>
             <a:r>
-              <a:rPr lang="en-US" smtClean="0"/>
+              <a:rPr lang="en-US"/>
               <a:t>Click to edit Master text styles</a:t>
             </a:r>
           </a:p>
@@ -1041,7 +1124,13 @@
       </p:sp>
       <p:sp>
         <p:nvSpPr>
-          <p:cNvPr id="4" name="Date Placeholder 3"/>
+          <p:cNvPr id="4" name="Date Placeholder 3">
+            <a:extLst>
+              <a:ext uri="{FF2B5EF4-FFF2-40B4-BE49-F238E27FC236}">
+                <a16:creationId xmlns:a16="http://schemas.microsoft.com/office/drawing/2014/main" id="{1BF4803F-89DA-1A86-353C-225535563611}"/>
+              </a:ext>
+            </a:extLst>
+          </p:cNvPr>
           <p:cNvSpPr>
             <a:spLocks noGrp="1"/>
           </p:cNvSpPr>
@@ -1054,18 +1143,23 @@
           <a:bodyPr/>
           <a:lstStyle/>
           <a:p>
-            <a:fld id="{1D8BD707-D9CF-40AE-B4C6-C98DA3205C09}" type="datetimeFigureOut">
-              <a:rPr lang="en-US" smtClean="0"/>
-              <a:pPr/>
-              <a:t>8/1/2011</a:t>
+            <a:fld id="{8AE7362A-84B1-4B09-A6AA-BD756A087DA6}" type="datetimeFigureOut">
+              <a:rPr lang="pt-BR" smtClean="0"/>
+              <a:t>19/06/2024</a:t>
             </a:fld>
-            <a:endParaRPr lang="en-US"/>
-          </a:p>
-        </p:txBody>
-      </p:sp>
-      <p:sp>
-        <p:nvSpPr>
-          <p:cNvPr id="5" name="Footer Placeholder 4"/>
+            <a:endParaRPr lang="pt-BR"/>
+          </a:p>
+        </p:txBody>
+      </p:sp>
+      <p:sp>
+        <p:nvSpPr>
+          <p:cNvPr id="5" name="Footer Placeholder 4">
+            <a:extLst>
+              <a:ext uri="{FF2B5EF4-FFF2-40B4-BE49-F238E27FC236}">
+                <a16:creationId xmlns:a16="http://schemas.microsoft.com/office/drawing/2014/main" id="{9AE00F62-ADF0-C230-57D6-4C902E7B9B22}"/>
+              </a:ext>
+            </a:extLst>
+          </p:cNvPr>
           <p:cNvSpPr>
             <a:spLocks noGrp="1"/>
           </p:cNvSpPr>
@@ -1078,13 +1172,19 @@
           <a:bodyPr/>
           <a:lstStyle/>
           <a:p>
-            <a:endParaRPr lang="en-US"/>
-          </a:p>
-        </p:txBody>
-      </p:sp>
-      <p:sp>
-        <p:nvSpPr>
-          <p:cNvPr id="6" name="Slide Number Placeholder 5"/>
+            <a:endParaRPr lang="pt-BR"/>
+          </a:p>
+        </p:txBody>
+      </p:sp>
+      <p:sp>
+        <p:nvSpPr>
+          <p:cNvPr id="6" name="Slide Number Placeholder 5">
+            <a:extLst>
+              <a:ext uri="{FF2B5EF4-FFF2-40B4-BE49-F238E27FC236}">
+                <a16:creationId xmlns:a16="http://schemas.microsoft.com/office/drawing/2014/main" id="{6048DD7B-0E3A-4197-ABF2-48AE344BB719}"/>
+              </a:ext>
+            </a:extLst>
+          </p:cNvPr>
           <p:cNvSpPr>
             <a:spLocks noGrp="1"/>
           </p:cNvSpPr>
@@ -1097,16 +1197,20 @@
           <a:bodyPr/>
           <a:lstStyle/>
           <a:p>
-            <a:fld id="{B6F15528-21DE-4FAA-801E-634DDDAF4B2B}" type="slidenum">
-              <a:rPr lang="en-US" smtClean="0"/>
-              <a:pPr/>
+            <a:fld id="{4EEAC180-CC41-4733-ADF9-C4B75E732B74}" type="slidenum">
+              <a:rPr lang="pt-BR" smtClean="0"/>
               <a:t>‹#›</a:t>
             </a:fld>
-            <a:endParaRPr lang="en-US"/>
+            <a:endParaRPr lang="pt-BR"/>
           </a:p>
         </p:txBody>
       </p:sp>
     </p:spTree>
+    <p:extLst>
+      <p:ext uri="{BB962C8B-B14F-4D97-AF65-F5344CB8AC3E}">
+        <p14:creationId xmlns:p14="http://schemas.microsoft.com/office/powerpoint/2010/main" val="1911370931"/>
+      </p:ext>
+    </p:extLst>
   </p:cSld>
   <p:clrMapOvr>
     <a:masterClrMapping/>
@@ -1133,7 +1237,13 @@
       </p:grpSpPr>
       <p:sp>
         <p:nvSpPr>
-          <p:cNvPr id="2" name="Title 1"/>
+          <p:cNvPr id="2" name="Title 1">
+            <a:extLst>
+              <a:ext uri="{FF2B5EF4-FFF2-40B4-BE49-F238E27FC236}">
+                <a16:creationId xmlns:a16="http://schemas.microsoft.com/office/drawing/2014/main" id="{7C637BEA-934A-43FC-6907-3FCC1F33ECCE}"/>
+              </a:ext>
+            </a:extLst>
+          </p:cNvPr>
           <p:cNvSpPr>
             <a:spLocks noGrp="1"/>
           </p:cNvSpPr>
@@ -1147,16 +1257,22 @@
           <a:lstStyle/>
           <a:p>
             <a:r>
-              <a:rPr lang="en-US" smtClean="0"/>
+              <a:rPr lang="en-US"/>
               <a:t>Click to edit Master title style</a:t>
             </a:r>
-            <a:endParaRPr lang="en-US"/>
-          </a:p>
-        </p:txBody>
-      </p:sp>
-      <p:sp>
-        <p:nvSpPr>
-          <p:cNvPr id="3" name="Content Placeholder 2"/>
+            <a:endParaRPr lang="pt-BR"/>
+          </a:p>
+        </p:txBody>
+      </p:sp>
+      <p:sp>
+        <p:nvSpPr>
+          <p:cNvPr id="3" name="Content Placeholder 2">
+            <a:extLst>
+              <a:ext uri="{FF2B5EF4-FFF2-40B4-BE49-F238E27FC236}">
+                <a16:creationId xmlns:a16="http://schemas.microsoft.com/office/drawing/2014/main" id="{F56CB5A2-01A4-6D6A-27A7-BC323528FD69}"/>
+              </a:ext>
+            </a:extLst>
+          </p:cNvPr>
           <p:cNvSpPr>
             <a:spLocks noGrp="1"/>
           </p:cNvSpPr>
@@ -1166,82 +1282,60 @@
         </p:nvSpPr>
         <p:spPr>
           <a:xfrm>
-            <a:off x="457200" y="1600200"/>
-            <a:ext cx="4038600" cy="4525963"/>
+            <a:off x="838200" y="1825625"/>
+            <a:ext cx="5181600" cy="4351338"/>
           </a:xfrm>
         </p:spPr>
         <p:txBody>
           <a:bodyPr/>
-          <a:lstStyle>
-            <a:lvl1pPr>
-              <a:defRPr sz="2800"/>
-            </a:lvl1pPr>
-            <a:lvl2pPr>
-              <a:defRPr sz="2400"/>
-            </a:lvl2pPr>
-            <a:lvl3pPr>
-              <a:defRPr sz="2000"/>
-            </a:lvl3pPr>
-            <a:lvl4pPr>
-              <a:defRPr sz="1800"/>
-            </a:lvl4pPr>
-            <a:lvl5pPr>
-              <a:defRPr sz="1800"/>
-            </a:lvl5pPr>
-            <a:lvl6pPr>
-              <a:defRPr sz="1800"/>
-            </a:lvl6pPr>
-            <a:lvl7pPr>
-              <a:defRPr sz="1800"/>
-            </a:lvl7pPr>
-            <a:lvl8pPr>
-              <a:defRPr sz="1800"/>
-            </a:lvl8pPr>
-            <a:lvl9pPr>
-              <a:defRPr sz="1800"/>
-            </a:lvl9pPr>
-          </a:lstStyle>
+          <a:lstStyle/>
           <a:p>
             <a:pPr lvl="0"/>
             <a:r>
-              <a:rPr lang="en-US" smtClean="0"/>
+              <a:rPr lang="en-US"/>
               <a:t>Click to edit Master text styles</a:t>
             </a:r>
           </a:p>
           <a:p>
             <a:pPr lvl="1"/>
             <a:r>
-              <a:rPr lang="en-US" smtClean="0"/>
+              <a:rPr lang="en-US"/>
               <a:t>Second level</a:t>
             </a:r>
           </a:p>
           <a:p>
             <a:pPr lvl="2"/>
             <a:r>
-              <a:rPr lang="en-US" smtClean="0"/>
+              <a:rPr lang="en-US"/>
               <a:t>Third level</a:t>
             </a:r>
           </a:p>
           <a:p>
             <a:pPr lvl="3"/>
             <a:r>
-              <a:rPr lang="en-US" smtClean="0"/>
+              <a:rPr lang="en-US"/>
               <a:t>Fourth level</a:t>
             </a:r>
           </a:p>
           <a:p>
             <a:pPr lvl="4"/>
             <a:r>
-              <a:rPr lang="en-US" smtClean="0"/>
+              <a:rPr lang="en-US"/>
               <a:t>Fifth level</a:t>
             </a:r>
-            <a:endParaRPr lang="en-US"/>
-          </a:p>
-        </p:txBody>
-      </p:sp>
-      <p:sp>
-        <p:nvSpPr>
-          <p:cNvPr id="4" name="Content Placeholder 3"/>
+            <a:endParaRPr lang="pt-BR"/>
+          </a:p>
+        </p:txBody>
+      </p:sp>
+      <p:sp>
+        <p:nvSpPr>
+          <p:cNvPr id="4" name="Content Placeholder 3">
+            <a:extLst>
+              <a:ext uri="{FF2B5EF4-FFF2-40B4-BE49-F238E27FC236}">
+                <a16:creationId xmlns:a16="http://schemas.microsoft.com/office/drawing/2014/main" id="{6FA52C38-49AE-C2EE-0EA8-C63BD85EAACE}"/>
+              </a:ext>
+            </a:extLst>
+          </p:cNvPr>
           <p:cNvSpPr>
             <a:spLocks noGrp="1"/>
           </p:cNvSpPr>
@@ -1251,82 +1345,60 @@
         </p:nvSpPr>
         <p:spPr>
           <a:xfrm>
-            <a:off x="4648200" y="1600200"/>
-            <a:ext cx="4038600" cy="4525963"/>
+            <a:off x="6172200" y="1825625"/>
+            <a:ext cx="5181600" cy="4351338"/>
           </a:xfrm>
         </p:spPr>
         <p:txBody>
           <a:bodyPr/>
-          <a:lstStyle>
-            <a:lvl1pPr>
-              <a:defRPr sz="2800"/>
-            </a:lvl1pPr>
-            <a:lvl2pPr>
-              <a:defRPr sz="2400"/>
-            </a:lvl2pPr>
-            <a:lvl3pPr>
-              <a:defRPr sz="2000"/>
-            </a:lvl3pPr>
-            <a:lvl4pPr>
-              <a:defRPr sz="1800"/>
-            </a:lvl4pPr>
-            <a:lvl5pPr>
-              <a:defRPr sz="1800"/>
-            </a:lvl5pPr>
-            <a:lvl6pPr>
-              <a:defRPr sz="1800"/>
-            </a:lvl6pPr>
-            <a:lvl7pPr>
-              <a:defRPr sz="1800"/>
-            </a:lvl7pPr>
-            <a:lvl8pPr>
-              <a:defRPr sz="1800"/>
-            </a:lvl8pPr>
-            <a:lvl9pPr>
-              <a:defRPr sz="1800"/>
-            </a:lvl9pPr>
-          </a:lstStyle>
+          <a:lstStyle/>
           <a:p>
             <a:pPr lvl="0"/>
             <a:r>
-              <a:rPr lang="en-US" smtClean="0"/>
+              <a:rPr lang="en-US"/>
               <a:t>Click to edit Master text styles</a:t>
             </a:r>
           </a:p>
           <a:p>
             <a:pPr lvl="1"/>
             <a:r>
-              <a:rPr lang="en-US" smtClean="0"/>
+              <a:rPr lang="en-US"/>
               <a:t>Second level</a:t>
             </a:r>
           </a:p>
           <a:p>
             <a:pPr lvl="2"/>
             <a:r>
-              <a:rPr lang="en-US" smtClean="0"/>
+              <a:rPr lang="en-US"/>
               <a:t>Third level</a:t>
             </a:r>
           </a:p>
           <a:p>
             <a:pPr lvl="3"/>
             <a:r>
-              <a:rPr lang="en-US" smtClean="0"/>
+              <a:rPr lang="en-US"/>
               <a:t>Fourth level</a:t>
             </a:r>
           </a:p>
           <a:p>
             <a:pPr lvl="4"/>
             <a:r>
-              <a:rPr lang="en-US" smtClean="0"/>
+              <a:rPr lang="en-US"/>
               <a:t>Fifth level</a:t>
             </a:r>
-            <a:endParaRPr lang="en-US"/>
-          </a:p>
-        </p:txBody>
-      </p:sp>
-      <p:sp>
-        <p:nvSpPr>
-          <p:cNvPr id="5" name="Date Placeholder 4"/>
+            <a:endParaRPr lang="pt-BR"/>
+          </a:p>
+        </p:txBody>
+      </p:sp>
+      <p:sp>
+        <p:nvSpPr>
+          <p:cNvPr id="5" name="Date Placeholder 4">
+            <a:extLst>
+              <a:ext uri="{FF2B5EF4-FFF2-40B4-BE49-F238E27FC236}">
+                <a16:creationId xmlns:a16="http://schemas.microsoft.com/office/drawing/2014/main" id="{CCEF2737-C288-120A-8DF3-755DA0CF33C9}"/>
+              </a:ext>
+            </a:extLst>
+          </p:cNvPr>
           <p:cNvSpPr>
             <a:spLocks noGrp="1"/>
           </p:cNvSpPr>
@@ -1339,18 +1411,23 @@
           <a:bodyPr/>
           <a:lstStyle/>
           <a:p>
-            <a:fld id="{1D8BD707-D9CF-40AE-B4C6-C98DA3205C09}" type="datetimeFigureOut">
-              <a:rPr lang="en-US" smtClean="0"/>
-              <a:pPr/>
-              <a:t>8/1/2011</a:t>
+            <a:fld id="{8AE7362A-84B1-4B09-A6AA-BD756A087DA6}" type="datetimeFigureOut">
+              <a:rPr lang="pt-BR" smtClean="0"/>
+              <a:t>19/06/2024</a:t>
             </a:fld>
-            <a:endParaRPr lang="en-US"/>
-          </a:p>
-        </p:txBody>
-      </p:sp>
-      <p:sp>
-        <p:nvSpPr>
-          <p:cNvPr id="6" name="Footer Placeholder 5"/>
+            <a:endParaRPr lang="pt-BR"/>
+          </a:p>
+        </p:txBody>
+      </p:sp>
+      <p:sp>
+        <p:nvSpPr>
+          <p:cNvPr id="6" name="Footer Placeholder 5">
+            <a:extLst>
+              <a:ext uri="{FF2B5EF4-FFF2-40B4-BE49-F238E27FC236}">
+                <a16:creationId xmlns:a16="http://schemas.microsoft.com/office/drawing/2014/main" id="{BF20518B-7683-4EEF-35A9-47DD4507C053}"/>
+              </a:ext>
+            </a:extLst>
+          </p:cNvPr>
           <p:cNvSpPr>
             <a:spLocks noGrp="1"/>
           </p:cNvSpPr>
@@ -1363,13 +1440,19 @@
           <a:bodyPr/>
           <a:lstStyle/>
           <a:p>
-            <a:endParaRPr lang="en-US"/>
-          </a:p>
-        </p:txBody>
-      </p:sp>
-      <p:sp>
-        <p:nvSpPr>
-          <p:cNvPr id="7" name="Slide Number Placeholder 6"/>
+            <a:endParaRPr lang="pt-BR"/>
+          </a:p>
+        </p:txBody>
+      </p:sp>
+      <p:sp>
+        <p:nvSpPr>
+          <p:cNvPr id="7" name="Slide Number Placeholder 6">
+            <a:extLst>
+              <a:ext uri="{FF2B5EF4-FFF2-40B4-BE49-F238E27FC236}">
+                <a16:creationId xmlns:a16="http://schemas.microsoft.com/office/drawing/2014/main" id="{88A1F22C-2910-1B5A-E331-D4171A0DAF4B}"/>
+              </a:ext>
+            </a:extLst>
+          </p:cNvPr>
           <p:cNvSpPr>
             <a:spLocks noGrp="1"/>
           </p:cNvSpPr>
@@ -1382,16 +1465,20 @@
           <a:bodyPr/>
           <a:lstStyle/>
           <a:p>
-            <a:fld id="{B6F15528-21DE-4FAA-801E-634DDDAF4B2B}" type="slidenum">
-              <a:rPr lang="en-US" smtClean="0"/>
-              <a:pPr/>
+            <a:fld id="{4EEAC180-CC41-4733-ADF9-C4B75E732B74}" type="slidenum">
+              <a:rPr lang="pt-BR" smtClean="0"/>
               <a:t>‹#›</a:t>
             </a:fld>
-            <a:endParaRPr lang="en-US"/>
+            <a:endParaRPr lang="pt-BR"/>
           </a:p>
         </p:txBody>
       </p:sp>
     </p:spTree>
+    <p:extLst>
+      <p:ext uri="{BB962C8B-B14F-4D97-AF65-F5344CB8AC3E}">
+        <p14:creationId xmlns:p14="http://schemas.microsoft.com/office/powerpoint/2010/main" val="1605127825"/>
+      </p:ext>
+    </p:extLst>
   </p:cSld>
   <p:clrMapOvr>
     <a:masterClrMapping/>
@@ -1418,45 +1505,58 @@
       </p:grpSpPr>
       <p:sp>
         <p:nvSpPr>
-          <p:cNvPr id="2" name="Title 1"/>
+          <p:cNvPr id="2" name="Title 1">
+            <a:extLst>
+              <a:ext uri="{FF2B5EF4-FFF2-40B4-BE49-F238E27FC236}">
+                <a16:creationId xmlns:a16="http://schemas.microsoft.com/office/drawing/2014/main" id="{AC5687A7-24B2-EF89-3E18-4138FB83C06A}"/>
+              </a:ext>
+            </a:extLst>
+          </p:cNvPr>
           <p:cNvSpPr>
             <a:spLocks noGrp="1"/>
           </p:cNvSpPr>
           <p:nvPr>
             <p:ph type="title"/>
-          </p:nvPr>
-        </p:nvSpPr>
-        <p:spPr/>
-        <p:txBody>
-          <a:bodyPr/>
-          <a:lstStyle>
-            <a:lvl1pPr>
-              <a:defRPr/>
-            </a:lvl1pPr>
-          </a:lstStyle>
-          <a:p>
-            <a:r>
-              <a:rPr lang="en-US" smtClean="0"/>
-              <a:t>Click to edit Master title style</a:t>
-            </a:r>
-            <a:endParaRPr lang="en-US"/>
-          </a:p>
-        </p:txBody>
-      </p:sp>
-      <p:sp>
-        <p:nvSpPr>
-          <p:cNvPr id="3" name="Text Placeholder 2"/>
-          <p:cNvSpPr>
-            <a:spLocks noGrp="1"/>
-          </p:cNvSpPr>
-          <p:nvPr>
-            <p:ph type="body" idx="1"/>
           </p:nvPr>
         </p:nvSpPr>
         <p:spPr>
           <a:xfrm>
-            <a:off x="457200" y="1535113"/>
-            <a:ext cx="4040188" cy="639762"/>
+            <a:off x="839788" y="365125"/>
+            <a:ext cx="10515600" cy="1325563"/>
+          </a:xfrm>
+        </p:spPr>
+        <p:txBody>
+          <a:bodyPr/>
+          <a:lstStyle/>
+          <a:p>
+            <a:r>
+              <a:rPr lang="en-US"/>
+              <a:t>Click to edit Master title style</a:t>
+            </a:r>
+            <a:endParaRPr lang="pt-BR"/>
+          </a:p>
+        </p:txBody>
+      </p:sp>
+      <p:sp>
+        <p:nvSpPr>
+          <p:cNvPr id="3" name="Text Placeholder 2">
+            <a:extLst>
+              <a:ext uri="{FF2B5EF4-FFF2-40B4-BE49-F238E27FC236}">
+                <a16:creationId xmlns:a16="http://schemas.microsoft.com/office/drawing/2014/main" id="{4A65EF3F-7249-0692-023C-DE8B31EA79AB}"/>
+              </a:ext>
+            </a:extLst>
+          </p:cNvPr>
+          <p:cNvSpPr>
+            <a:spLocks noGrp="1"/>
+          </p:cNvSpPr>
+          <p:nvPr>
+            <p:ph type="body" idx="1"/>
+          </p:nvPr>
+        </p:nvSpPr>
+        <p:spPr>
+          <a:xfrm>
+            <a:off x="839788" y="1681163"/>
+            <a:ext cx="5157787" cy="823912"/>
           </a:xfrm>
         </p:spPr>
         <p:txBody>
@@ -1502,7 +1602,7 @@
           <a:p>
             <a:pPr lvl="0"/>
             <a:r>
-              <a:rPr lang="en-US" smtClean="0"/>
+              <a:rPr lang="en-US"/>
               <a:t>Click to edit Master text styles</a:t>
             </a:r>
           </a:p>
@@ -1510,7 +1610,13 @@
       </p:sp>
       <p:sp>
         <p:nvSpPr>
-          <p:cNvPr id="4" name="Content Placeholder 3"/>
+          <p:cNvPr id="4" name="Content Placeholder 3">
+            <a:extLst>
+              <a:ext uri="{FF2B5EF4-FFF2-40B4-BE49-F238E27FC236}">
+                <a16:creationId xmlns:a16="http://schemas.microsoft.com/office/drawing/2014/main" id="{ACCAF2A8-AA09-7171-01D9-72824278AD8B}"/>
+              </a:ext>
+            </a:extLst>
+          </p:cNvPr>
           <p:cNvSpPr>
             <a:spLocks noGrp="1"/>
           </p:cNvSpPr>
@@ -1520,82 +1626,60 @@
         </p:nvSpPr>
         <p:spPr>
           <a:xfrm>
-            <a:off x="457200" y="2174875"/>
-            <a:ext cx="4040188" cy="3951288"/>
+            <a:off x="839788" y="2505075"/>
+            <a:ext cx="5157787" cy="3684588"/>
           </a:xfrm>
         </p:spPr>
         <p:txBody>
           <a:bodyPr/>
-          <a:lstStyle>
-            <a:lvl1pPr>
-              <a:defRPr sz="2400"/>
-            </a:lvl1pPr>
-            <a:lvl2pPr>
-              <a:defRPr sz="2000"/>
-            </a:lvl2pPr>
-            <a:lvl3pPr>
-              <a:defRPr sz="1800"/>
-            </a:lvl3pPr>
-            <a:lvl4pPr>
-              <a:defRPr sz="1600"/>
-            </a:lvl4pPr>
-            <a:lvl5pPr>
-              <a:defRPr sz="1600"/>
-            </a:lvl5pPr>
-            <a:lvl6pPr>
-              <a:defRPr sz="1600"/>
-            </a:lvl6pPr>
-            <a:lvl7pPr>
-              <a:defRPr sz="1600"/>
-            </a:lvl7pPr>
-            <a:lvl8pPr>
-              <a:defRPr sz="1600"/>
-            </a:lvl8pPr>
-            <a:lvl9pPr>
-              <a:defRPr sz="1600"/>
-            </a:lvl9pPr>
-          </a:lstStyle>
+          <a:lstStyle/>
           <a:p>
             <a:pPr lvl="0"/>
             <a:r>
-              <a:rPr lang="en-US" smtClean="0"/>
+              <a:rPr lang="en-US"/>
               <a:t>Click to edit Master text styles</a:t>
             </a:r>
           </a:p>
           <a:p>
             <a:pPr lvl="1"/>
             <a:r>
-              <a:rPr lang="en-US" smtClean="0"/>
+              <a:rPr lang="en-US"/>
               <a:t>Second level</a:t>
             </a:r>
           </a:p>
           <a:p>
             <a:pPr lvl="2"/>
             <a:r>
-              <a:rPr lang="en-US" smtClean="0"/>
+              <a:rPr lang="en-US"/>
               <a:t>Third level</a:t>
             </a:r>
           </a:p>
           <a:p>
             <a:pPr lvl="3"/>
             <a:r>
-              <a:rPr lang="en-US" smtClean="0"/>
+              <a:rPr lang="en-US"/>
               <a:t>Fourth level</a:t>
             </a:r>
           </a:p>
           <a:p>
             <a:pPr lvl="4"/>
             <a:r>
-              <a:rPr lang="en-US" smtClean="0"/>
+              <a:rPr lang="en-US"/>
               <a:t>Fifth level</a:t>
             </a:r>
-            <a:endParaRPr lang="en-US"/>
-          </a:p>
-        </p:txBody>
-      </p:sp>
-      <p:sp>
-        <p:nvSpPr>
-          <p:cNvPr id="5" name="Text Placeholder 4"/>
+            <a:endParaRPr lang="pt-BR"/>
+          </a:p>
+        </p:txBody>
+      </p:sp>
+      <p:sp>
+        <p:nvSpPr>
+          <p:cNvPr id="5" name="Text Placeholder 4">
+            <a:extLst>
+              <a:ext uri="{FF2B5EF4-FFF2-40B4-BE49-F238E27FC236}">
+                <a16:creationId xmlns:a16="http://schemas.microsoft.com/office/drawing/2014/main" id="{CFE0987A-A419-5672-5DA9-3E34728D1F21}"/>
+              </a:ext>
+            </a:extLst>
+          </p:cNvPr>
           <p:cNvSpPr>
             <a:spLocks noGrp="1"/>
           </p:cNvSpPr>
@@ -1605,8 +1689,8 @@
         </p:nvSpPr>
         <p:spPr>
           <a:xfrm>
-            <a:off x="4645025" y="1535113"/>
-            <a:ext cx="4041775" cy="639762"/>
+            <a:off x="6172200" y="1681163"/>
+            <a:ext cx="5183188" cy="823912"/>
           </a:xfrm>
         </p:spPr>
         <p:txBody>
@@ -1652,7 +1736,7 @@
           <a:p>
             <a:pPr lvl="0"/>
             <a:r>
-              <a:rPr lang="en-US" smtClean="0"/>
+              <a:rPr lang="en-US"/>
               <a:t>Click to edit Master text styles</a:t>
             </a:r>
           </a:p>
@@ -1660,7 +1744,13 @@
       </p:sp>
       <p:sp>
         <p:nvSpPr>
-          <p:cNvPr id="6" name="Content Placeholder 5"/>
+          <p:cNvPr id="6" name="Content Placeholder 5">
+            <a:extLst>
+              <a:ext uri="{FF2B5EF4-FFF2-40B4-BE49-F238E27FC236}">
+                <a16:creationId xmlns:a16="http://schemas.microsoft.com/office/drawing/2014/main" id="{22FB01DA-2CD9-0CA3-C576-BA6AFED427D7}"/>
+              </a:ext>
+            </a:extLst>
+          </p:cNvPr>
           <p:cNvSpPr>
             <a:spLocks noGrp="1"/>
           </p:cNvSpPr>
@@ -1670,82 +1760,60 @@
         </p:nvSpPr>
         <p:spPr>
           <a:xfrm>
-            <a:off x="4645025" y="2174875"/>
-            <a:ext cx="4041775" cy="3951288"/>
+            <a:off x="6172200" y="2505075"/>
+            <a:ext cx="5183188" cy="3684588"/>
           </a:xfrm>
         </p:spPr>
         <p:txBody>
           <a:bodyPr/>
-          <a:lstStyle>
-            <a:lvl1pPr>
-              <a:defRPr sz="2400"/>
-            </a:lvl1pPr>
-            <a:lvl2pPr>
-              <a:defRPr sz="2000"/>
-            </a:lvl2pPr>
-            <a:lvl3pPr>
-              <a:defRPr sz="1800"/>
-            </a:lvl3pPr>
-            <a:lvl4pPr>
-              <a:defRPr sz="1600"/>
-            </a:lvl4pPr>
-            <a:lvl5pPr>
-              <a:defRPr sz="1600"/>
-            </a:lvl5pPr>
-            <a:lvl6pPr>
-              <a:defRPr sz="1600"/>
-            </a:lvl6pPr>
-            <a:lvl7pPr>
-              <a:defRPr sz="1600"/>
-            </a:lvl7pPr>
-            <a:lvl8pPr>
-              <a:defRPr sz="1600"/>
-            </a:lvl8pPr>
-            <a:lvl9pPr>
-              <a:defRPr sz="1600"/>
-            </a:lvl9pPr>
-          </a:lstStyle>
+          <a:lstStyle/>
           <a:p>
             <a:pPr lvl="0"/>
             <a:r>
-              <a:rPr lang="en-US" smtClean="0"/>
+              <a:rPr lang="en-US"/>
               <a:t>Click to edit Master text styles</a:t>
             </a:r>
           </a:p>
           <a:p>
             <a:pPr lvl="1"/>
             <a:r>
-              <a:rPr lang="en-US" smtClean="0"/>
+              <a:rPr lang="en-US"/>
               <a:t>Second level</a:t>
             </a:r>
           </a:p>
           <a:p>
             <a:pPr lvl="2"/>
             <a:r>
-              <a:rPr lang="en-US" smtClean="0"/>
+              <a:rPr lang="en-US"/>
               <a:t>Third level</a:t>
             </a:r>
           </a:p>
           <a:p>
             <a:pPr lvl="3"/>
             <a:r>
-              <a:rPr lang="en-US" smtClean="0"/>
+              <a:rPr lang="en-US"/>
               <a:t>Fourth level</a:t>
             </a:r>
           </a:p>
           <a:p>
             <a:pPr lvl="4"/>
             <a:r>
-              <a:rPr lang="en-US" smtClean="0"/>
+              <a:rPr lang="en-US"/>
               <a:t>Fifth level</a:t>
             </a:r>
-            <a:endParaRPr lang="en-US"/>
-          </a:p>
-        </p:txBody>
-      </p:sp>
-      <p:sp>
-        <p:nvSpPr>
-          <p:cNvPr id="7" name="Date Placeholder 6"/>
+            <a:endParaRPr lang="pt-BR"/>
+          </a:p>
+        </p:txBody>
+      </p:sp>
+      <p:sp>
+        <p:nvSpPr>
+          <p:cNvPr id="7" name="Date Placeholder 6">
+            <a:extLst>
+              <a:ext uri="{FF2B5EF4-FFF2-40B4-BE49-F238E27FC236}">
+                <a16:creationId xmlns:a16="http://schemas.microsoft.com/office/drawing/2014/main" id="{64DD7A6D-8634-84C8-AACE-DD27EA9E4974}"/>
+              </a:ext>
+            </a:extLst>
+          </p:cNvPr>
           <p:cNvSpPr>
             <a:spLocks noGrp="1"/>
           </p:cNvSpPr>
@@ -1758,18 +1826,23 @@
           <a:bodyPr/>
           <a:lstStyle/>
           <a:p>
-            <a:fld id="{1D8BD707-D9CF-40AE-B4C6-C98DA3205C09}" type="datetimeFigureOut">
-              <a:rPr lang="en-US" smtClean="0"/>
-              <a:pPr/>
-              <a:t>8/1/2011</a:t>
+            <a:fld id="{8AE7362A-84B1-4B09-A6AA-BD756A087DA6}" type="datetimeFigureOut">
+              <a:rPr lang="pt-BR" smtClean="0"/>
+              <a:t>19/06/2024</a:t>
             </a:fld>
-            <a:endParaRPr lang="en-US"/>
-          </a:p>
-        </p:txBody>
-      </p:sp>
-      <p:sp>
-        <p:nvSpPr>
-          <p:cNvPr id="8" name="Footer Placeholder 7"/>
+            <a:endParaRPr lang="pt-BR"/>
+          </a:p>
+        </p:txBody>
+      </p:sp>
+      <p:sp>
+        <p:nvSpPr>
+          <p:cNvPr id="8" name="Footer Placeholder 7">
+            <a:extLst>
+              <a:ext uri="{FF2B5EF4-FFF2-40B4-BE49-F238E27FC236}">
+                <a16:creationId xmlns:a16="http://schemas.microsoft.com/office/drawing/2014/main" id="{FDD981A0-55DB-869C-3FCD-B9A5CFB7E289}"/>
+              </a:ext>
+            </a:extLst>
+          </p:cNvPr>
           <p:cNvSpPr>
             <a:spLocks noGrp="1"/>
           </p:cNvSpPr>
@@ -1782,13 +1855,19 @@
           <a:bodyPr/>
           <a:lstStyle/>
           <a:p>
-            <a:endParaRPr lang="en-US"/>
-          </a:p>
-        </p:txBody>
-      </p:sp>
-      <p:sp>
-        <p:nvSpPr>
-          <p:cNvPr id="9" name="Slide Number Placeholder 8"/>
+            <a:endParaRPr lang="pt-BR"/>
+          </a:p>
+        </p:txBody>
+      </p:sp>
+      <p:sp>
+        <p:nvSpPr>
+          <p:cNvPr id="9" name="Slide Number Placeholder 8">
+            <a:extLst>
+              <a:ext uri="{FF2B5EF4-FFF2-40B4-BE49-F238E27FC236}">
+                <a16:creationId xmlns:a16="http://schemas.microsoft.com/office/drawing/2014/main" id="{3A8C0A45-D910-36B7-FBEE-F8060FBB0FFF}"/>
+              </a:ext>
+            </a:extLst>
+          </p:cNvPr>
           <p:cNvSpPr>
             <a:spLocks noGrp="1"/>
           </p:cNvSpPr>
@@ -1801,16 +1880,20 @@
           <a:bodyPr/>
           <a:lstStyle/>
           <a:p>
-            <a:fld id="{B6F15528-21DE-4FAA-801E-634DDDAF4B2B}" type="slidenum">
-              <a:rPr lang="en-US" smtClean="0"/>
-              <a:pPr/>
+            <a:fld id="{4EEAC180-CC41-4733-ADF9-C4B75E732B74}" type="slidenum">
+              <a:rPr lang="pt-BR" smtClean="0"/>
               <a:t>‹#›</a:t>
             </a:fld>
-            <a:endParaRPr lang="en-US"/>
+            <a:endParaRPr lang="pt-BR"/>
           </a:p>
         </p:txBody>
       </p:sp>
     </p:spTree>
+    <p:extLst>
+      <p:ext uri="{BB962C8B-B14F-4D97-AF65-F5344CB8AC3E}">
+        <p14:creationId xmlns:p14="http://schemas.microsoft.com/office/powerpoint/2010/main" val="4053826757"/>
+      </p:ext>
+    </p:extLst>
   </p:cSld>
   <p:clrMapOvr>
     <a:masterClrMapping/>
@@ -1837,7 +1920,13 @@
       </p:grpSpPr>
       <p:sp>
         <p:nvSpPr>
-          <p:cNvPr id="2" name="Title 1"/>
+          <p:cNvPr id="2" name="Title 1">
+            <a:extLst>
+              <a:ext uri="{FF2B5EF4-FFF2-40B4-BE49-F238E27FC236}">
+                <a16:creationId xmlns:a16="http://schemas.microsoft.com/office/drawing/2014/main" id="{42B924D7-8871-3C0D-A2F6-208F16D8CD3E}"/>
+              </a:ext>
+            </a:extLst>
+          </p:cNvPr>
           <p:cNvSpPr>
             <a:spLocks noGrp="1"/>
           </p:cNvSpPr>
@@ -1851,16 +1940,22 @@
           <a:lstStyle/>
           <a:p>
             <a:r>
-              <a:rPr lang="en-US" smtClean="0"/>
+              <a:rPr lang="en-US"/>
               <a:t>Click to edit Master title style</a:t>
             </a:r>
-            <a:endParaRPr lang="en-US"/>
-          </a:p>
-        </p:txBody>
-      </p:sp>
-      <p:sp>
-        <p:nvSpPr>
-          <p:cNvPr id="3" name="Date Placeholder 2"/>
+            <a:endParaRPr lang="pt-BR"/>
+          </a:p>
+        </p:txBody>
+      </p:sp>
+      <p:sp>
+        <p:nvSpPr>
+          <p:cNvPr id="3" name="Date Placeholder 2">
+            <a:extLst>
+              <a:ext uri="{FF2B5EF4-FFF2-40B4-BE49-F238E27FC236}">
+                <a16:creationId xmlns:a16="http://schemas.microsoft.com/office/drawing/2014/main" id="{3CDD4766-BD53-B9C4-FB5C-E6DBBAFFE87F}"/>
+              </a:ext>
+            </a:extLst>
+          </p:cNvPr>
           <p:cNvSpPr>
             <a:spLocks noGrp="1"/>
           </p:cNvSpPr>
@@ -1873,18 +1968,23 @@
           <a:bodyPr/>
           <a:lstStyle/>
           <a:p>
-            <a:fld id="{1D8BD707-D9CF-40AE-B4C6-C98DA3205C09}" type="datetimeFigureOut">
-              <a:rPr lang="en-US" smtClean="0"/>
-              <a:pPr/>
-              <a:t>8/1/2011</a:t>
+            <a:fld id="{8AE7362A-84B1-4B09-A6AA-BD756A087DA6}" type="datetimeFigureOut">
+              <a:rPr lang="pt-BR" smtClean="0"/>
+              <a:t>19/06/2024</a:t>
             </a:fld>
-            <a:endParaRPr lang="en-US"/>
-          </a:p>
-        </p:txBody>
-      </p:sp>
-      <p:sp>
-        <p:nvSpPr>
-          <p:cNvPr id="4" name="Footer Placeholder 3"/>
+            <a:endParaRPr lang="pt-BR"/>
+          </a:p>
+        </p:txBody>
+      </p:sp>
+      <p:sp>
+        <p:nvSpPr>
+          <p:cNvPr id="4" name="Footer Placeholder 3">
+            <a:extLst>
+              <a:ext uri="{FF2B5EF4-FFF2-40B4-BE49-F238E27FC236}">
+                <a16:creationId xmlns:a16="http://schemas.microsoft.com/office/drawing/2014/main" id="{4C793E24-FEBA-815C-BC5B-0F9304B9D7FC}"/>
+              </a:ext>
+            </a:extLst>
+          </p:cNvPr>
           <p:cNvSpPr>
             <a:spLocks noGrp="1"/>
           </p:cNvSpPr>
@@ -1897,13 +1997,19 @@
           <a:bodyPr/>
           <a:lstStyle/>
           <a:p>
-            <a:endParaRPr lang="en-US"/>
-          </a:p>
-        </p:txBody>
-      </p:sp>
-      <p:sp>
-        <p:nvSpPr>
-          <p:cNvPr id="5" name="Slide Number Placeholder 4"/>
+            <a:endParaRPr lang="pt-BR"/>
+          </a:p>
+        </p:txBody>
+      </p:sp>
+      <p:sp>
+        <p:nvSpPr>
+          <p:cNvPr id="5" name="Slide Number Placeholder 4">
+            <a:extLst>
+              <a:ext uri="{FF2B5EF4-FFF2-40B4-BE49-F238E27FC236}">
+                <a16:creationId xmlns:a16="http://schemas.microsoft.com/office/drawing/2014/main" id="{9AC48895-70BE-B408-30F6-0F34647A6AAD}"/>
+              </a:ext>
+            </a:extLst>
+          </p:cNvPr>
           <p:cNvSpPr>
             <a:spLocks noGrp="1"/>
           </p:cNvSpPr>
@@ -1916,16 +2022,20 @@
           <a:bodyPr/>
           <a:lstStyle/>
           <a:p>
-            <a:fld id="{B6F15528-21DE-4FAA-801E-634DDDAF4B2B}" type="slidenum">
-              <a:rPr lang="en-US" smtClean="0"/>
-              <a:pPr/>
+            <a:fld id="{4EEAC180-CC41-4733-ADF9-C4B75E732B74}" type="slidenum">
+              <a:rPr lang="pt-BR" smtClean="0"/>
               <a:t>‹#›</a:t>
             </a:fld>
-            <a:endParaRPr lang="en-US"/>
+            <a:endParaRPr lang="pt-BR"/>
           </a:p>
         </p:txBody>
       </p:sp>
     </p:spTree>
+    <p:extLst>
+      <p:ext uri="{BB962C8B-B14F-4D97-AF65-F5344CB8AC3E}">
+        <p14:creationId xmlns:p14="http://schemas.microsoft.com/office/powerpoint/2010/main" val="3489621298"/>
+      </p:ext>
+    </p:extLst>
   </p:cSld>
   <p:clrMapOvr>
     <a:masterClrMapping/>
@@ -1952,7 +2062,13 @@
       </p:grpSpPr>
       <p:sp>
         <p:nvSpPr>
-          <p:cNvPr id="2" name="Date Placeholder 1"/>
+          <p:cNvPr id="2" name="Date Placeholder 1">
+            <a:extLst>
+              <a:ext uri="{FF2B5EF4-FFF2-40B4-BE49-F238E27FC236}">
+                <a16:creationId xmlns:a16="http://schemas.microsoft.com/office/drawing/2014/main" id="{99D402DA-0CAD-75B5-5921-ACDA78619F6B}"/>
+              </a:ext>
+            </a:extLst>
+          </p:cNvPr>
           <p:cNvSpPr>
             <a:spLocks noGrp="1"/>
           </p:cNvSpPr>
@@ -1965,18 +2081,23 @@
           <a:bodyPr/>
           <a:lstStyle/>
           <a:p>
-            <a:fld id="{1D8BD707-D9CF-40AE-B4C6-C98DA3205C09}" type="datetimeFigureOut">
-              <a:rPr lang="en-US" smtClean="0"/>
-              <a:pPr/>
-              <a:t>8/1/2011</a:t>
+            <a:fld id="{8AE7362A-84B1-4B09-A6AA-BD756A087DA6}" type="datetimeFigureOut">
+              <a:rPr lang="pt-BR" smtClean="0"/>
+              <a:t>19/06/2024</a:t>
             </a:fld>
-            <a:endParaRPr lang="en-US"/>
-          </a:p>
-        </p:txBody>
-      </p:sp>
-      <p:sp>
-        <p:nvSpPr>
-          <p:cNvPr id="3" name="Footer Placeholder 2"/>
+            <a:endParaRPr lang="pt-BR"/>
+          </a:p>
+        </p:txBody>
+      </p:sp>
+      <p:sp>
+        <p:nvSpPr>
+          <p:cNvPr id="3" name="Footer Placeholder 2">
+            <a:extLst>
+              <a:ext uri="{FF2B5EF4-FFF2-40B4-BE49-F238E27FC236}">
+                <a16:creationId xmlns:a16="http://schemas.microsoft.com/office/drawing/2014/main" id="{23D3AD9B-AB74-8B74-8010-336E2C527D76}"/>
+              </a:ext>
+            </a:extLst>
+          </p:cNvPr>
           <p:cNvSpPr>
             <a:spLocks noGrp="1"/>
           </p:cNvSpPr>
@@ -1989,13 +2110,19 @@
           <a:bodyPr/>
           <a:lstStyle/>
           <a:p>
-            <a:endParaRPr lang="en-US"/>
-          </a:p>
-        </p:txBody>
-      </p:sp>
-      <p:sp>
-        <p:nvSpPr>
-          <p:cNvPr id="4" name="Slide Number Placeholder 3"/>
+            <a:endParaRPr lang="pt-BR"/>
+          </a:p>
+        </p:txBody>
+      </p:sp>
+      <p:sp>
+        <p:nvSpPr>
+          <p:cNvPr id="4" name="Slide Number Placeholder 3">
+            <a:extLst>
+              <a:ext uri="{FF2B5EF4-FFF2-40B4-BE49-F238E27FC236}">
+                <a16:creationId xmlns:a16="http://schemas.microsoft.com/office/drawing/2014/main" id="{41EBD8B5-C1F5-06AE-990C-B8155E29C532}"/>
+              </a:ext>
+            </a:extLst>
+          </p:cNvPr>
           <p:cNvSpPr>
             <a:spLocks noGrp="1"/>
           </p:cNvSpPr>
@@ -2008,16 +2135,20 @@
           <a:bodyPr/>
           <a:lstStyle/>
           <a:p>
-            <a:fld id="{B6F15528-21DE-4FAA-801E-634DDDAF4B2B}" type="slidenum">
-              <a:rPr lang="en-US" smtClean="0"/>
-              <a:pPr/>
+            <a:fld id="{4EEAC180-CC41-4733-ADF9-C4B75E732B74}" type="slidenum">
+              <a:rPr lang="pt-BR" smtClean="0"/>
               <a:t>‹#›</a:t>
             </a:fld>
-            <a:endParaRPr lang="en-US"/>
+            <a:endParaRPr lang="pt-BR"/>
           </a:p>
         </p:txBody>
       </p:sp>
     </p:spTree>
+    <p:extLst>
+      <p:ext uri="{BB962C8B-B14F-4D97-AF65-F5344CB8AC3E}">
+        <p14:creationId xmlns:p14="http://schemas.microsoft.com/office/powerpoint/2010/main" val="131228236"/>
+      </p:ext>
+    </p:extLst>
   </p:cSld>
   <p:clrMapOvr>
     <a:masterClrMapping/>
@@ -2044,7 +2175,13 @@
       </p:grpSpPr>
       <p:sp>
         <p:nvSpPr>
-          <p:cNvPr id="2" name="Title 1"/>
+          <p:cNvPr id="2" name="Title 1">
+            <a:extLst>
+              <a:ext uri="{FF2B5EF4-FFF2-40B4-BE49-F238E27FC236}">
+                <a16:creationId xmlns:a16="http://schemas.microsoft.com/office/drawing/2014/main" id="{19320321-5620-7616-2D2F-E7BF76996276}"/>
+              </a:ext>
+            </a:extLst>
+          </p:cNvPr>
           <p:cNvSpPr>
             <a:spLocks noGrp="1"/>
           </p:cNvSpPr>
@@ -2054,29 +2191,35 @@
         </p:nvSpPr>
         <p:spPr>
           <a:xfrm>
-            <a:off x="457200" y="273050"/>
-            <a:ext cx="3008313" cy="1162050"/>
+            <a:off x="839788" y="457200"/>
+            <a:ext cx="3932237" cy="1600200"/>
           </a:xfrm>
         </p:spPr>
         <p:txBody>
           <a:bodyPr anchor="b"/>
           <a:lstStyle>
-            <a:lvl1pPr algn="l">
-              <a:defRPr sz="2000" b="1"/>
+            <a:lvl1pPr>
+              <a:defRPr sz="3200"/>
             </a:lvl1pPr>
           </a:lstStyle>
           <a:p>
             <a:r>
-              <a:rPr lang="en-US" smtClean="0"/>
+              <a:rPr lang="en-US"/>
               <a:t>Click to edit Master title style</a:t>
             </a:r>
-            <a:endParaRPr lang="en-US"/>
-          </a:p>
-        </p:txBody>
-      </p:sp>
-      <p:sp>
-        <p:nvSpPr>
-          <p:cNvPr id="3" name="Content Placeholder 2"/>
+            <a:endParaRPr lang="pt-BR"/>
+          </a:p>
+        </p:txBody>
+      </p:sp>
+      <p:sp>
+        <p:nvSpPr>
+          <p:cNvPr id="3" name="Content Placeholder 2">
+            <a:extLst>
+              <a:ext uri="{FF2B5EF4-FFF2-40B4-BE49-F238E27FC236}">
+                <a16:creationId xmlns:a16="http://schemas.microsoft.com/office/drawing/2014/main" id="{4484F57D-6691-D750-AB39-2A1C8FEF43BC}"/>
+              </a:ext>
+            </a:extLst>
+          </p:cNvPr>
           <p:cNvSpPr>
             <a:spLocks noGrp="1"/>
           </p:cNvSpPr>
@@ -2086,8 +2229,8 @@
         </p:nvSpPr>
         <p:spPr>
           <a:xfrm>
-            <a:off x="3575050" y="273050"/>
-            <a:ext cx="5111750" cy="5853113"/>
+            <a:off x="5183188" y="987425"/>
+            <a:ext cx="6172200" cy="4873625"/>
           </a:xfrm>
         </p:spPr>
         <p:txBody>
@@ -2124,44 +2267,50 @@
           <a:p>
             <a:pPr lvl="0"/>
             <a:r>
-              <a:rPr lang="en-US" smtClean="0"/>
+              <a:rPr lang="en-US"/>
               <a:t>Click to edit Master text styles</a:t>
             </a:r>
           </a:p>
           <a:p>
             <a:pPr lvl="1"/>
             <a:r>
-              <a:rPr lang="en-US" smtClean="0"/>
+              <a:rPr lang="en-US"/>
               <a:t>Second level</a:t>
             </a:r>
           </a:p>
           <a:p>
             <a:pPr lvl="2"/>
             <a:r>
-              <a:rPr lang="en-US" smtClean="0"/>
+              <a:rPr lang="en-US"/>
               <a:t>Third level</a:t>
             </a:r>
           </a:p>
           <a:p>
             <a:pPr lvl="3"/>
             <a:r>
-              <a:rPr lang="en-US" smtClean="0"/>
+              <a:rPr lang="en-US"/>
               <a:t>Fourth level</a:t>
             </a:r>
           </a:p>
           <a:p>
             <a:pPr lvl="4"/>
             <a:r>
-              <a:rPr lang="en-US" smtClean="0"/>
+              <a:rPr lang="en-US"/>
               <a:t>Fifth level</a:t>
             </a:r>
-            <a:endParaRPr lang="en-US"/>
-          </a:p>
-        </p:txBody>
-      </p:sp>
-      <p:sp>
-        <p:nvSpPr>
-          <p:cNvPr id="4" name="Text Placeholder 3"/>
+            <a:endParaRPr lang="pt-BR"/>
+          </a:p>
+        </p:txBody>
+      </p:sp>
+      <p:sp>
+        <p:nvSpPr>
+          <p:cNvPr id="4" name="Text Placeholder 3">
+            <a:extLst>
+              <a:ext uri="{FF2B5EF4-FFF2-40B4-BE49-F238E27FC236}">
+                <a16:creationId xmlns:a16="http://schemas.microsoft.com/office/drawing/2014/main" id="{0E4EDEC3-65EA-1699-7181-715337374B2D}"/>
+              </a:ext>
+            </a:extLst>
+          </p:cNvPr>
           <p:cNvSpPr>
             <a:spLocks noGrp="1"/>
           </p:cNvSpPr>
@@ -2171,8 +2320,8 @@
         </p:nvSpPr>
         <p:spPr>
           <a:xfrm>
-            <a:off x="457200" y="1435100"/>
-            <a:ext cx="3008313" cy="4691063"/>
+            <a:off x="839788" y="2057400"/>
+            <a:ext cx="3932237" cy="3811588"/>
           </a:xfrm>
         </p:spPr>
         <p:txBody>
@@ -2180,45 +2329,45 @@
           <a:lstStyle>
             <a:lvl1pPr marL="0" indent="0">
               <a:buNone/>
-              <a:defRPr sz="1400"/>
+              <a:defRPr sz="1600"/>
             </a:lvl1pPr>
             <a:lvl2pPr marL="457200" indent="0">
               <a:buNone/>
-              <a:defRPr sz="1200"/>
+              <a:defRPr sz="1400"/>
             </a:lvl2pPr>
             <a:lvl3pPr marL="914400" indent="0">
               <a:buNone/>
-              <a:defRPr sz="1000"/>
+              <a:defRPr sz="1200"/>
             </a:lvl3pPr>
             <a:lvl4pPr marL="1371600" indent="0">
               <a:buNone/>
-              <a:defRPr sz="900"/>
+              <a:defRPr sz="1000"/>
             </a:lvl4pPr>
             <a:lvl5pPr marL="1828800" indent="0">
               <a:buNone/>
-              <a:defRPr sz="900"/>
+              <a:defRPr sz="1000"/>
             </a:lvl5pPr>
             <a:lvl6pPr marL="2286000" indent="0">
               <a:buNone/>
-              <a:defRPr sz="900"/>
+              <a:defRPr sz="1000"/>
             </a:lvl6pPr>
             <a:lvl7pPr marL="2743200" indent="0">
               <a:buNone/>
-              <a:defRPr sz="900"/>
+              <a:defRPr sz="1000"/>
             </a:lvl7pPr>
             <a:lvl8pPr marL="3200400" indent="0">
               <a:buNone/>
-              <a:defRPr sz="900"/>
+              <a:defRPr sz="1000"/>
             </a:lvl8pPr>
             <a:lvl9pPr marL="3657600" indent="0">
               <a:buNone/>
-              <a:defRPr sz="900"/>
+              <a:defRPr sz="1000"/>
             </a:lvl9pPr>
           </a:lstStyle>
           <a:p>
             <a:pPr lvl="0"/>
             <a:r>
-              <a:rPr lang="en-US" smtClean="0"/>
+              <a:rPr lang="en-US"/>
               <a:t>Click to edit Master text styles</a:t>
             </a:r>
           </a:p>
@@ -2226,7 +2375,13 @@
       </p:sp>
       <p:sp>
         <p:nvSpPr>
-          <p:cNvPr id="5" name="Date Placeholder 4"/>
+          <p:cNvPr id="5" name="Date Placeholder 4">
+            <a:extLst>
+              <a:ext uri="{FF2B5EF4-FFF2-40B4-BE49-F238E27FC236}">
+                <a16:creationId xmlns:a16="http://schemas.microsoft.com/office/drawing/2014/main" id="{DA69821D-FA61-569F-1482-15663DC887E4}"/>
+              </a:ext>
+            </a:extLst>
+          </p:cNvPr>
           <p:cNvSpPr>
             <a:spLocks noGrp="1"/>
           </p:cNvSpPr>
@@ -2239,18 +2394,23 @@
           <a:bodyPr/>
           <a:lstStyle/>
           <a:p>
-            <a:fld id="{1D8BD707-D9CF-40AE-B4C6-C98DA3205C09}" type="datetimeFigureOut">
-              <a:rPr lang="en-US" smtClean="0"/>
-              <a:pPr/>
-              <a:t>8/1/2011</a:t>
+            <a:fld id="{8AE7362A-84B1-4B09-A6AA-BD756A087DA6}" type="datetimeFigureOut">
+              <a:rPr lang="pt-BR" smtClean="0"/>
+              <a:t>19/06/2024</a:t>
             </a:fld>
-            <a:endParaRPr lang="en-US"/>
-          </a:p>
-        </p:txBody>
-      </p:sp>
-      <p:sp>
-        <p:nvSpPr>
-          <p:cNvPr id="6" name="Footer Placeholder 5"/>
+            <a:endParaRPr lang="pt-BR"/>
+          </a:p>
+        </p:txBody>
+      </p:sp>
+      <p:sp>
+        <p:nvSpPr>
+          <p:cNvPr id="6" name="Footer Placeholder 5">
+            <a:extLst>
+              <a:ext uri="{FF2B5EF4-FFF2-40B4-BE49-F238E27FC236}">
+                <a16:creationId xmlns:a16="http://schemas.microsoft.com/office/drawing/2014/main" id="{3CBB4038-C7B8-54A6-A197-1E4D4EF235D1}"/>
+              </a:ext>
+            </a:extLst>
+          </p:cNvPr>
           <p:cNvSpPr>
             <a:spLocks noGrp="1"/>
           </p:cNvSpPr>
@@ -2263,13 +2423,19 @@
           <a:bodyPr/>
           <a:lstStyle/>
           <a:p>
-            <a:endParaRPr lang="en-US"/>
-          </a:p>
-        </p:txBody>
-      </p:sp>
-      <p:sp>
-        <p:nvSpPr>
-          <p:cNvPr id="7" name="Slide Number Placeholder 6"/>
+            <a:endParaRPr lang="pt-BR"/>
+          </a:p>
+        </p:txBody>
+      </p:sp>
+      <p:sp>
+        <p:nvSpPr>
+          <p:cNvPr id="7" name="Slide Number Placeholder 6">
+            <a:extLst>
+              <a:ext uri="{FF2B5EF4-FFF2-40B4-BE49-F238E27FC236}">
+                <a16:creationId xmlns:a16="http://schemas.microsoft.com/office/drawing/2014/main" id="{78F12A97-779C-DD1D-01D2-4602DA2B10F3}"/>
+              </a:ext>
+            </a:extLst>
+          </p:cNvPr>
           <p:cNvSpPr>
             <a:spLocks noGrp="1"/>
           </p:cNvSpPr>
@@ -2282,16 +2448,20 @@
           <a:bodyPr/>
           <a:lstStyle/>
           <a:p>
-            <a:fld id="{B6F15528-21DE-4FAA-801E-634DDDAF4B2B}" type="slidenum">
-              <a:rPr lang="en-US" smtClean="0"/>
-              <a:pPr/>
+            <a:fld id="{4EEAC180-CC41-4733-ADF9-C4B75E732B74}" type="slidenum">
+              <a:rPr lang="pt-BR" smtClean="0"/>
               <a:t>‹#›</a:t>
             </a:fld>
-            <a:endParaRPr lang="en-US"/>
+            <a:endParaRPr lang="pt-BR"/>
           </a:p>
         </p:txBody>
       </p:sp>
     </p:spTree>
+    <p:extLst>
+      <p:ext uri="{BB962C8B-B14F-4D97-AF65-F5344CB8AC3E}">
+        <p14:creationId xmlns:p14="http://schemas.microsoft.com/office/powerpoint/2010/main" val="1432841118"/>
+      </p:ext>
+    </p:extLst>
   </p:cSld>
   <p:clrMapOvr>
     <a:masterClrMapping/>
@@ -2318,7 +2488,13 @@
       </p:grpSpPr>
       <p:sp>
         <p:nvSpPr>
-          <p:cNvPr id="2" name="Title 1"/>
+          <p:cNvPr id="2" name="Title 1">
+            <a:extLst>
+              <a:ext uri="{FF2B5EF4-FFF2-40B4-BE49-F238E27FC236}">
+                <a16:creationId xmlns:a16="http://schemas.microsoft.com/office/drawing/2014/main" id="{94BFD103-2F40-1A9E-62CD-D03E4B233932}"/>
+              </a:ext>
+            </a:extLst>
+          </p:cNvPr>
           <p:cNvSpPr>
             <a:spLocks noGrp="1"/>
           </p:cNvSpPr>
@@ -2328,29 +2504,35 @@
         </p:nvSpPr>
         <p:spPr>
           <a:xfrm>
-            <a:off x="1792288" y="4800600"/>
-            <a:ext cx="5486400" cy="566738"/>
+            <a:off x="839788" y="457200"/>
+            <a:ext cx="3932237" cy="1600200"/>
           </a:xfrm>
         </p:spPr>
         <p:txBody>
           <a:bodyPr anchor="b"/>
           <a:lstStyle>
-            <a:lvl1pPr algn="l">
-              <a:defRPr sz="2000" b="1"/>
+            <a:lvl1pPr>
+              <a:defRPr sz="3200"/>
             </a:lvl1pPr>
           </a:lstStyle>
           <a:p>
             <a:r>
-              <a:rPr lang="en-US" smtClean="0"/>
+              <a:rPr lang="en-US"/>
               <a:t>Click to edit Master title style</a:t>
             </a:r>
-            <a:endParaRPr lang="en-US"/>
-          </a:p>
-        </p:txBody>
-      </p:sp>
-      <p:sp>
-        <p:nvSpPr>
-          <p:cNvPr id="3" name="Picture Placeholder 2"/>
+            <a:endParaRPr lang="pt-BR"/>
+          </a:p>
+        </p:txBody>
+      </p:sp>
+      <p:sp>
+        <p:nvSpPr>
+          <p:cNvPr id="3" name="Picture Placeholder 2">
+            <a:extLst>
+              <a:ext uri="{FF2B5EF4-FFF2-40B4-BE49-F238E27FC236}">
+                <a16:creationId xmlns:a16="http://schemas.microsoft.com/office/drawing/2014/main" id="{EC79F0BE-3D59-C1ED-596F-08B3BBA3CF0A}"/>
+              </a:ext>
+            </a:extLst>
+          </p:cNvPr>
           <p:cNvSpPr>
             <a:spLocks noGrp="1"/>
           </p:cNvSpPr>
@@ -2360,8 +2542,8 @@
         </p:nvSpPr>
         <p:spPr>
           <a:xfrm>
-            <a:off x="1792288" y="612775"/>
-            <a:ext cx="5486400" cy="4114800"/>
+            <a:off x="5183188" y="987425"/>
+            <a:ext cx="6172200" cy="4873625"/>
           </a:xfrm>
         </p:spPr>
         <p:txBody>
@@ -2405,13 +2587,19 @@
             </a:lvl9pPr>
           </a:lstStyle>
           <a:p>
-            <a:endParaRPr lang="en-US"/>
-          </a:p>
-        </p:txBody>
-      </p:sp>
-      <p:sp>
-        <p:nvSpPr>
-          <p:cNvPr id="4" name="Text Placeholder 3"/>
+            <a:endParaRPr lang="pt-BR"/>
+          </a:p>
+        </p:txBody>
+      </p:sp>
+      <p:sp>
+        <p:nvSpPr>
+          <p:cNvPr id="4" name="Text Placeholder 3">
+            <a:extLst>
+              <a:ext uri="{FF2B5EF4-FFF2-40B4-BE49-F238E27FC236}">
+                <a16:creationId xmlns:a16="http://schemas.microsoft.com/office/drawing/2014/main" id="{1824882D-E6DA-DD51-2845-F3FCA4B7D656}"/>
+              </a:ext>
+            </a:extLst>
+          </p:cNvPr>
           <p:cNvSpPr>
             <a:spLocks noGrp="1"/>
           </p:cNvSpPr>
@@ -2421,8 +2609,8 @@
         </p:nvSpPr>
         <p:spPr>
           <a:xfrm>
-            <a:off x="1792288" y="5367338"/>
-            <a:ext cx="5486400" cy="804862"/>
+            <a:off x="839788" y="2057400"/>
+            <a:ext cx="3932237" cy="3811588"/>
           </a:xfrm>
         </p:spPr>
         <p:txBody>
@@ -2430,45 +2618,45 @@
           <a:lstStyle>
             <a:lvl1pPr marL="0" indent="0">
               <a:buNone/>
-              <a:defRPr sz="1400"/>
+              <a:defRPr sz="1600"/>
             </a:lvl1pPr>
             <a:lvl2pPr marL="457200" indent="0">
               <a:buNone/>
-              <a:defRPr sz="1200"/>
+              <a:defRPr sz="1400"/>
             </a:lvl2pPr>
             <a:lvl3pPr marL="914400" indent="0">
               <a:buNone/>
-              <a:defRPr sz="1000"/>
+              <a:defRPr sz="1200"/>
             </a:lvl3pPr>
             <a:lvl4pPr marL="1371600" indent="0">
               <a:buNone/>
-              <a:defRPr sz="900"/>
+              <a:defRPr sz="1000"/>
             </a:lvl4pPr>
             <a:lvl5pPr marL="1828800" indent="0">
               <a:buNone/>
-              <a:defRPr sz="900"/>
+              <a:defRPr sz="1000"/>
             </a:lvl5pPr>
             <a:lvl6pPr marL="2286000" indent="0">
               <a:buNone/>
-              <a:defRPr sz="900"/>
+              <a:defRPr sz="1000"/>
             </a:lvl6pPr>
             <a:lvl7pPr marL="2743200" indent="0">
               <a:buNone/>
-              <a:defRPr sz="900"/>
+              <a:defRPr sz="1000"/>
             </a:lvl7pPr>
             <a:lvl8pPr marL="3200400" indent="0">
               <a:buNone/>
-              <a:defRPr sz="900"/>
+              <a:defRPr sz="1000"/>
             </a:lvl8pPr>
             <a:lvl9pPr marL="3657600" indent="0">
               <a:buNone/>
-              <a:defRPr sz="900"/>
+              <a:defRPr sz="1000"/>
             </a:lvl9pPr>
           </a:lstStyle>
           <a:p>
             <a:pPr lvl="0"/>
             <a:r>
-              <a:rPr lang="en-US" smtClean="0"/>
+              <a:rPr lang="en-US"/>
               <a:t>Click to edit Master text styles</a:t>
             </a:r>
           </a:p>
@@ -2476,7 +2664,13 @@
       </p:sp>
       <p:sp>
         <p:nvSpPr>
-          <p:cNvPr id="5" name="Date Placeholder 4"/>
+          <p:cNvPr id="5" name="Date Placeholder 4">
+            <a:extLst>
+              <a:ext uri="{FF2B5EF4-FFF2-40B4-BE49-F238E27FC236}">
+                <a16:creationId xmlns:a16="http://schemas.microsoft.com/office/drawing/2014/main" id="{25A3C9C6-BF3E-0B6B-B5A3-8BB0417B5B88}"/>
+              </a:ext>
+            </a:extLst>
+          </p:cNvPr>
           <p:cNvSpPr>
             <a:spLocks noGrp="1"/>
           </p:cNvSpPr>
@@ -2489,18 +2683,23 @@
           <a:bodyPr/>
           <a:lstStyle/>
           <a:p>
-            <a:fld id="{1D8BD707-D9CF-40AE-B4C6-C98DA3205C09}" type="datetimeFigureOut">
-              <a:rPr lang="en-US" smtClean="0"/>
-              <a:pPr/>
-              <a:t>8/1/2011</a:t>
+            <a:fld id="{8AE7362A-84B1-4B09-A6AA-BD756A087DA6}" type="datetimeFigureOut">
+              <a:rPr lang="pt-BR" smtClean="0"/>
+              <a:t>19/06/2024</a:t>
             </a:fld>
-            <a:endParaRPr lang="en-US"/>
-          </a:p>
-        </p:txBody>
-      </p:sp>
-      <p:sp>
-        <p:nvSpPr>
-          <p:cNvPr id="6" name="Footer Placeholder 5"/>
+            <a:endParaRPr lang="pt-BR"/>
+          </a:p>
+        </p:txBody>
+      </p:sp>
+      <p:sp>
+        <p:nvSpPr>
+          <p:cNvPr id="6" name="Footer Placeholder 5">
+            <a:extLst>
+              <a:ext uri="{FF2B5EF4-FFF2-40B4-BE49-F238E27FC236}">
+                <a16:creationId xmlns:a16="http://schemas.microsoft.com/office/drawing/2014/main" id="{F8DD9A7A-33E8-EC69-5AAA-420D974CD279}"/>
+              </a:ext>
+            </a:extLst>
+          </p:cNvPr>
           <p:cNvSpPr>
             <a:spLocks noGrp="1"/>
           </p:cNvSpPr>
@@ -2513,13 +2712,19 @@
           <a:bodyPr/>
           <a:lstStyle/>
           <a:p>
-            <a:endParaRPr lang="en-US"/>
-          </a:p>
-        </p:txBody>
-      </p:sp>
-      <p:sp>
-        <p:nvSpPr>
-          <p:cNvPr id="7" name="Slide Number Placeholder 6"/>
+            <a:endParaRPr lang="pt-BR"/>
+          </a:p>
+        </p:txBody>
+      </p:sp>
+      <p:sp>
+        <p:nvSpPr>
+          <p:cNvPr id="7" name="Slide Number Placeholder 6">
+            <a:extLst>
+              <a:ext uri="{FF2B5EF4-FFF2-40B4-BE49-F238E27FC236}">
+                <a16:creationId xmlns:a16="http://schemas.microsoft.com/office/drawing/2014/main" id="{52EC3A64-5B00-3724-63A8-A91F333973DA}"/>
+              </a:ext>
+            </a:extLst>
+          </p:cNvPr>
           <p:cNvSpPr>
             <a:spLocks noGrp="1"/>
           </p:cNvSpPr>
@@ -2532,16 +2737,20 @@
           <a:bodyPr/>
           <a:lstStyle/>
           <a:p>
-            <a:fld id="{B6F15528-21DE-4FAA-801E-634DDDAF4B2B}" type="slidenum">
-              <a:rPr lang="en-US" smtClean="0"/>
-              <a:pPr/>
+            <a:fld id="{4EEAC180-CC41-4733-ADF9-C4B75E732B74}" type="slidenum">
+              <a:rPr lang="pt-BR" smtClean="0"/>
               <a:t>‹#›</a:t>
             </a:fld>
-            <a:endParaRPr lang="en-US"/>
+            <a:endParaRPr lang="pt-BR"/>
           </a:p>
         </p:txBody>
       </p:sp>
     </p:spTree>
+    <p:extLst>
+      <p:ext uri="{BB962C8B-B14F-4D97-AF65-F5344CB8AC3E}">
+        <p14:creationId xmlns:p14="http://schemas.microsoft.com/office/powerpoint/2010/main" val="1146695531"/>
+      </p:ext>
+    </p:extLst>
   </p:cSld>
   <p:clrMapOvr>
     <a:masterClrMapping/>
@@ -2573,7 +2782,13 @@
       </p:grpSpPr>
       <p:sp>
         <p:nvSpPr>
-          <p:cNvPr id="2" name="Title Placeholder 1"/>
+          <p:cNvPr id="2" name="Title Placeholder 1">
+            <a:extLst>
+              <a:ext uri="{FF2B5EF4-FFF2-40B4-BE49-F238E27FC236}">
+                <a16:creationId xmlns:a16="http://schemas.microsoft.com/office/drawing/2014/main" id="{919D0203-48D2-9DD9-D57F-75BD8B0C07C9}"/>
+              </a:ext>
+            </a:extLst>
+          </p:cNvPr>
           <p:cNvSpPr>
             <a:spLocks noGrp="1"/>
           </p:cNvSpPr>
@@ -2583,8 +2798,8 @@
         </p:nvSpPr>
         <p:spPr>
           <a:xfrm>
-            <a:off x="457200" y="274638"/>
-            <a:ext cx="8229600" cy="1143000"/>
+            <a:off x="838200" y="365125"/>
+            <a:ext cx="10515600" cy="1325563"/>
           </a:xfrm>
           <a:prstGeom prst="rect">
             <a:avLst/>
@@ -2597,16 +2812,22 @@
           <a:lstStyle/>
           <a:p>
             <a:r>
-              <a:rPr lang="en-US" smtClean="0"/>
+              <a:rPr lang="en-US"/>
               <a:t>Click to edit Master title style</a:t>
             </a:r>
-            <a:endParaRPr lang="en-US"/>
-          </a:p>
-        </p:txBody>
-      </p:sp>
-      <p:sp>
-        <p:nvSpPr>
-          <p:cNvPr id="3" name="Text Placeholder 2"/>
+            <a:endParaRPr lang="pt-BR"/>
+          </a:p>
+        </p:txBody>
+      </p:sp>
+      <p:sp>
+        <p:nvSpPr>
+          <p:cNvPr id="3" name="Text Placeholder 2">
+            <a:extLst>
+              <a:ext uri="{FF2B5EF4-FFF2-40B4-BE49-F238E27FC236}">
+                <a16:creationId xmlns:a16="http://schemas.microsoft.com/office/drawing/2014/main" id="{D1935A1C-C38D-5E58-F896-F0123F244C6D}"/>
+              </a:ext>
+            </a:extLst>
+          </p:cNvPr>
           <p:cNvSpPr>
             <a:spLocks noGrp="1"/>
           </p:cNvSpPr>
@@ -2616,8 +2837,8 @@
         </p:nvSpPr>
         <p:spPr>
           <a:xfrm>
-            <a:off x="457200" y="1600200"/>
-            <a:ext cx="8229600" cy="4525963"/>
+            <a:off x="838200" y="1825625"/>
+            <a:ext cx="10515600" cy="4351338"/>
           </a:xfrm>
           <a:prstGeom prst="rect">
             <a:avLst/>
@@ -2631,44 +2852,50 @@
           <a:p>
             <a:pPr lvl="0"/>
             <a:r>
-              <a:rPr lang="en-US" smtClean="0"/>
+              <a:rPr lang="en-US"/>
               <a:t>Click to edit Master text styles</a:t>
             </a:r>
           </a:p>
           <a:p>
             <a:pPr lvl="1"/>
             <a:r>
-              <a:rPr lang="en-US" smtClean="0"/>
+              <a:rPr lang="en-US"/>
               <a:t>Second level</a:t>
             </a:r>
           </a:p>
           <a:p>
             <a:pPr lvl="2"/>
             <a:r>
-              <a:rPr lang="en-US" smtClean="0"/>
+              <a:rPr lang="en-US"/>
               <a:t>Third level</a:t>
             </a:r>
           </a:p>
           <a:p>
             <a:pPr lvl="3"/>
             <a:r>
-              <a:rPr lang="en-US" smtClean="0"/>
+              <a:rPr lang="en-US"/>
               <a:t>Fourth level</a:t>
             </a:r>
           </a:p>
           <a:p>
             <a:pPr lvl="4"/>
             <a:r>
-              <a:rPr lang="en-US" smtClean="0"/>
+              <a:rPr lang="en-US"/>
               <a:t>Fifth level</a:t>
             </a:r>
-            <a:endParaRPr lang="en-US"/>
-          </a:p>
-        </p:txBody>
-      </p:sp>
-      <p:sp>
-        <p:nvSpPr>
-          <p:cNvPr id="4" name="Date Placeholder 3"/>
+            <a:endParaRPr lang="pt-BR"/>
+          </a:p>
+        </p:txBody>
+      </p:sp>
+      <p:sp>
+        <p:nvSpPr>
+          <p:cNvPr id="4" name="Date Placeholder 3">
+            <a:extLst>
+              <a:ext uri="{FF2B5EF4-FFF2-40B4-BE49-F238E27FC236}">
+                <a16:creationId xmlns:a16="http://schemas.microsoft.com/office/drawing/2014/main" id="{A32C2664-D0A4-C70C-C099-CAC6F792842B}"/>
+              </a:ext>
+            </a:extLst>
+          </p:cNvPr>
           <p:cNvSpPr>
             <a:spLocks noGrp="1"/>
           </p:cNvSpPr>
@@ -2678,8 +2905,8 @@
         </p:nvSpPr>
         <p:spPr>
           <a:xfrm>
-            <a:off x="457200" y="6356350"/>
-            <a:ext cx="2133600" cy="365125"/>
+            <a:off x="838200" y="6356350"/>
+            <a:ext cx="2743200" cy="365125"/>
           </a:xfrm>
           <a:prstGeom prst="rect">
             <a:avLst/>
@@ -2692,25 +2919,30 @@
               <a:defRPr sz="1200">
                 <a:solidFill>
                   <a:schemeClr val="tx1">
-                    <a:tint val="75000"/>
+                    <a:tint val="82000"/>
                   </a:schemeClr>
                 </a:solidFill>
               </a:defRPr>
             </a:lvl1pPr>
           </a:lstStyle>
           <a:p>
-            <a:fld id="{1D8BD707-D9CF-40AE-B4C6-C98DA3205C09}" type="datetimeFigureOut">
-              <a:rPr lang="en-US" smtClean="0"/>
-              <a:pPr/>
-              <a:t>8/1/2011</a:t>
+            <a:fld id="{8AE7362A-84B1-4B09-A6AA-BD756A087DA6}" type="datetimeFigureOut">
+              <a:rPr lang="pt-BR" smtClean="0"/>
+              <a:t>19/06/2024</a:t>
             </a:fld>
-            <a:endParaRPr lang="en-US"/>
-          </a:p>
-        </p:txBody>
-      </p:sp>
-      <p:sp>
-        <p:nvSpPr>
-          <p:cNvPr id="5" name="Footer Placeholder 4"/>
+            <a:endParaRPr lang="pt-BR"/>
+          </a:p>
+        </p:txBody>
+      </p:sp>
+      <p:sp>
+        <p:nvSpPr>
+          <p:cNvPr id="5" name="Footer Placeholder 4">
+            <a:extLst>
+              <a:ext uri="{FF2B5EF4-FFF2-40B4-BE49-F238E27FC236}">
+                <a16:creationId xmlns:a16="http://schemas.microsoft.com/office/drawing/2014/main" id="{2B992961-FEB2-82F3-4D18-CDC3B24513D3}"/>
+              </a:ext>
+            </a:extLst>
+          </p:cNvPr>
           <p:cNvSpPr>
             <a:spLocks noGrp="1"/>
           </p:cNvSpPr>
@@ -2720,8 +2952,8 @@
         </p:nvSpPr>
         <p:spPr>
           <a:xfrm>
-            <a:off x="3124200" y="6356350"/>
-            <a:ext cx="2895600" cy="365125"/>
+            <a:off x="4038600" y="6356350"/>
+            <a:ext cx="4114800" cy="365125"/>
           </a:xfrm>
           <a:prstGeom prst="rect">
             <a:avLst/>
@@ -2734,20 +2966,26 @@
               <a:defRPr sz="1200">
                 <a:solidFill>
                   <a:schemeClr val="tx1">
-                    <a:tint val="75000"/>
+                    <a:tint val="82000"/>
                   </a:schemeClr>
                 </a:solidFill>
               </a:defRPr>
             </a:lvl1pPr>
           </a:lstStyle>
           <a:p>
-            <a:endParaRPr lang="en-US"/>
-          </a:p>
-        </p:txBody>
-      </p:sp>
-      <p:sp>
-        <p:nvSpPr>
-          <p:cNvPr id="6" name="Slide Number Placeholder 5"/>
+            <a:endParaRPr lang="pt-BR"/>
+          </a:p>
+        </p:txBody>
+      </p:sp>
+      <p:sp>
+        <p:nvSpPr>
+          <p:cNvPr id="6" name="Slide Number Placeholder 5">
+            <a:extLst>
+              <a:ext uri="{FF2B5EF4-FFF2-40B4-BE49-F238E27FC236}">
+                <a16:creationId xmlns:a16="http://schemas.microsoft.com/office/drawing/2014/main" id="{E11B936C-382F-4F73-8EB4-C5CB89A1B167}"/>
+              </a:ext>
+            </a:extLst>
+          </p:cNvPr>
           <p:cNvSpPr>
             <a:spLocks noGrp="1"/>
           </p:cNvSpPr>
@@ -2757,8 +2995,8 @@
         </p:nvSpPr>
         <p:spPr>
           <a:xfrm>
-            <a:off x="6553200" y="6356350"/>
-            <a:ext cx="2133600" cy="365125"/>
+            <a:off x="8610600" y="6356350"/>
+            <a:ext cx="2743200" cy="365125"/>
           </a:xfrm>
           <a:prstGeom prst="rect">
             <a:avLst/>
@@ -2771,23 +3009,27 @@
               <a:defRPr sz="1200">
                 <a:solidFill>
                   <a:schemeClr val="tx1">
-                    <a:tint val="75000"/>
+                    <a:tint val="82000"/>
                   </a:schemeClr>
                 </a:solidFill>
               </a:defRPr>
             </a:lvl1pPr>
           </a:lstStyle>
           <a:p>
-            <a:fld id="{B6F15528-21DE-4FAA-801E-634DDDAF4B2B}" type="slidenum">
-              <a:rPr lang="en-US" smtClean="0"/>
-              <a:pPr/>
+            <a:fld id="{4EEAC180-CC41-4733-ADF9-C4B75E732B74}" type="slidenum">
+              <a:rPr lang="pt-BR" smtClean="0"/>
               <a:t>‹#›</a:t>
             </a:fld>
-            <a:endParaRPr lang="en-US"/>
+            <a:endParaRPr lang="pt-BR"/>
           </a:p>
         </p:txBody>
       </p:sp>
     </p:spTree>
+    <p:extLst>
+      <p:ext uri="{BB962C8B-B14F-4D97-AF65-F5344CB8AC3E}">
+        <p14:creationId xmlns:p14="http://schemas.microsoft.com/office/powerpoint/2010/main" val="224373723"/>
+      </p:ext>
+    </p:extLst>
   </p:cSld>
   <p:clrMap bg1="lt1" tx1="dk1" bg2="lt2" tx2="dk2" accent1="accent1" accent2="accent2" accent3="accent3" accent4="accent4" accent5="accent5" accent6="accent6" hlink="hlink" folHlink="folHlink"/>
   <p:sldLayoutIdLst>
@@ -2805,7 +3047,10 @@
   </p:sldLayoutIdLst>
   <p:txStyles>
     <p:titleStyle>
-      <a:lvl1pPr algn="ctr" defTabSz="914400" rtl="0" eaLnBrk="1" latinLnBrk="0" hangingPunct="1">
+      <a:lvl1pPr algn="l" defTabSz="914400" rtl="0" eaLnBrk="1" latinLnBrk="0" hangingPunct="1">
+        <a:lnSpc>
+          <a:spcPct val="90000"/>
+        </a:lnSpc>
         <a:spcBef>
           <a:spcPct val="0"/>
         </a:spcBef>
@@ -2821,13 +3066,16 @@
       </a:lvl1pPr>
     </p:titleStyle>
     <p:bodyStyle>
-      <a:lvl1pPr marL="342900" indent="-342900" algn="l" defTabSz="914400" rtl="0" eaLnBrk="1" latinLnBrk="0" hangingPunct="1">
+      <a:lvl1pPr marL="228600" indent="-228600" algn="l" defTabSz="914400" rtl="0" eaLnBrk="1" latinLnBrk="0" hangingPunct="1">
+        <a:lnSpc>
+          <a:spcPct val="90000"/>
+        </a:lnSpc>
         <a:spcBef>
-          <a:spcPct val="20000"/>
+          <a:spcPts val="1000"/>
         </a:spcBef>
-        <a:buFont typeface="Arial" pitchFamily="34" charset="0"/>
+        <a:buFont typeface="Arial" panose="020B0604020202020204" pitchFamily="34" charset="0"/>
         <a:buChar char="•"/>
-        <a:defRPr sz="3200" kern="1200">
+        <a:defRPr sz="2800" kern="1200">
           <a:solidFill>
             <a:schemeClr val="tx1"/>
           </a:solidFill>
@@ -2836,13 +3084,16 @@
           <a:cs typeface="+mn-cs"/>
         </a:defRPr>
       </a:lvl1pPr>
-      <a:lvl2pPr marL="742950" indent="-285750" algn="l" defTabSz="914400" rtl="0" eaLnBrk="1" latinLnBrk="0" hangingPunct="1">
+      <a:lvl2pPr marL="685800" indent="-228600" algn="l" defTabSz="914400" rtl="0" eaLnBrk="1" latinLnBrk="0" hangingPunct="1">
+        <a:lnSpc>
+          <a:spcPct val="90000"/>
+        </a:lnSpc>
         <a:spcBef>
-          <a:spcPct val="20000"/>
+          <a:spcPts val="500"/>
         </a:spcBef>
-        <a:buFont typeface="Arial" pitchFamily="34" charset="0"/>
-        <a:buChar char="–"/>
-        <a:defRPr sz="2800" kern="1200">
+        <a:buFont typeface="Arial" panose="020B0604020202020204" pitchFamily="34" charset="0"/>
+        <a:buChar char="•"/>
+        <a:defRPr sz="2400" kern="1200">
           <a:solidFill>
             <a:schemeClr val="tx1"/>
           </a:solidFill>
@@ -2852,12 +3103,15 @@
         </a:defRPr>
       </a:lvl2pPr>
       <a:lvl3pPr marL="1143000" indent="-228600" algn="l" defTabSz="914400" rtl="0" eaLnBrk="1" latinLnBrk="0" hangingPunct="1">
+        <a:lnSpc>
+          <a:spcPct val="90000"/>
+        </a:lnSpc>
         <a:spcBef>
-          <a:spcPct val="20000"/>
+          <a:spcPts val="500"/>
         </a:spcBef>
-        <a:buFont typeface="Arial" pitchFamily="34" charset="0"/>
+        <a:buFont typeface="Arial" panose="020B0604020202020204" pitchFamily="34" charset="0"/>
         <a:buChar char="•"/>
-        <a:defRPr sz="2400" kern="1200">
+        <a:defRPr sz="2000" kern="1200">
           <a:solidFill>
             <a:schemeClr val="tx1"/>
           </a:solidFill>
@@ -2867,12 +3121,15 @@
         </a:defRPr>
       </a:lvl3pPr>
       <a:lvl4pPr marL="1600200" indent="-228600" algn="l" defTabSz="914400" rtl="0" eaLnBrk="1" latinLnBrk="0" hangingPunct="1">
+        <a:lnSpc>
+          <a:spcPct val="90000"/>
+        </a:lnSpc>
         <a:spcBef>
-          <a:spcPct val="20000"/>
+          <a:spcPts val="500"/>
         </a:spcBef>
-        <a:buFont typeface="Arial" pitchFamily="34" charset="0"/>
-        <a:buChar char="–"/>
-        <a:defRPr sz="2000" kern="1200">
+        <a:buFont typeface="Arial" panose="020B0604020202020204" pitchFamily="34" charset="0"/>
+        <a:buChar char="•"/>
+        <a:defRPr sz="1800" kern="1200">
           <a:solidFill>
             <a:schemeClr val="tx1"/>
           </a:solidFill>
@@ -2882,12 +3139,15 @@
         </a:defRPr>
       </a:lvl4pPr>
       <a:lvl5pPr marL="2057400" indent="-228600" algn="l" defTabSz="914400" rtl="0" eaLnBrk="1" latinLnBrk="0" hangingPunct="1">
+        <a:lnSpc>
+          <a:spcPct val="90000"/>
+        </a:lnSpc>
         <a:spcBef>
-          <a:spcPct val="20000"/>
+          <a:spcPts val="500"/>
         </a:spcBef>
-        <a:buFont typeface="Arial" pitchFamily="34" charset="0"/>
-        <a:buChar char="»"/>
-        <a:defRPr sz="2000" kern="1200">
+        <a:buFont typeface="Arial" panose="020B0604020202020204" pitchFamily="34" charset="0"/>
+        <a:buChar char="•"/>
+        <a:defRPr sz="1800" kern="1200">
           <a:solidFill>
             <a:schemeClr val="tx1"/>
           </a:solidFill>
@@ -2897,12 +3157,15 @@
         </a:defRPr>
       </a:lvl5pPr>
       <a:lvl6pPr marL="2514600" indent="-228600" algn="l" defTabSz="914400" rtl="0" eaLnBrk="1" latinLnBrk="0" hangingPunct="1">
+        <a:lnSpc>
+          <a:spcPct val="90000"/>
+        </a:lnSpc>
         <a:spcBef>
-          <a:spcPct val="20000"/>
+          <a:spcPts val="500"/>
         </a:spcBef>
-        <a:buFont typeface="Arial" pitchFamily="34" charset="0"/>
+        <a:buFont typeface="Arial" panose="020B0604020202020204" pitchFamily="34" charset="0"/>
         <a:buChar char="•"/>
-        <a:defRPr sz="2000" kern="1200">
+        <a:defRPr sz="1800" kern="1200">
           <a:solidFill>
             <a:schemeClr val="tx1"/>
           </a:solidFill>
@@ -2912,12 +3175,15 @@
         </a:defRPr>
       </a:lvl6pPr>
       <a:lvl7pPr marL="2971800" indent="-228600" algn="l" defTabSz="914400" rtl="0" eaLnBrk="1" latinLnBrk="0" hangingPunct="1">
+        <a:lnSpc>
+          <a:spcPct val="90000"/>
+        </a:lnSpc>
         <a:spcBef>
-          <a:spcPct val="20000"/>
+          <a:spcPts val="500"/>
         </a:spcBef>
-        <a:buFont typeface="Arial" pitchFamily="34" charset="0"/>
+        <a:buFont typeface="Arial" panose="020B0604020202020204" pitchFamily="34" charset="0"/>
         <a:buChar char="•"/>
-        <a:defRPr sz="2000" kern="1200">
+        <a:defRPr sz="1800" kern="1200">
           <a:solidFill>
             <a:schemeClr val="tx1"/>
           </a:solidFill>
@@ -2927,12 +3193,15 @@
         </a:defRPr>
       </a:lvl7pPr>
       <a:lvl8pPr marL="3429000" indent="-228600" algn="l" defTabSz="914400" rtl="0" eaLnBrk="1" latinLnBrk="0" hangingPunct="1">
+        <a:lnSpc>
+          <a:spcPct val="90000"/>
+        </a:lnSpc>
         <a:spcBef>
-          <a:spcPct val="20000"/>
+          <a:spcPts val="500"/>
         </a:spcBef>
-        <a:buFont typeface="Arial" pitchFamily="34" charset="0"/>
+        <a:buFont typeface="Arial" panose="020B0604020202020204" pitchFamily="34" charset="0"/>
         <a:buChar char="•"/>
-        <a:defRPr sz="2000" kern="1200">
+        <a:defRPr sz="1800" kern="1200">
           <a:solidFill>
             <a:schemeClr val="tx1"/>
           </a:solidFill>
@@ -2942,12 +3211,15 @@
         </a:defRPr>
       </a:lvl8pPr>
       <a:lvl9pPr marL="3886200" indent="-228600" algn="l" defTabSz="914400" rtl="0" eaLnBrk="1" latinLnBrk="0" hangingPunct="1">
+        <a:lnSpc>
+          <a:spcPct val="90000"/>
+        </a:lnSpc>
         <a:spcBef>
-          <a:spcPct val="20000"/>
+          <a:spcPts val="500"/>
         </a:spcBef>
-        <a:buFont typeface="Arial" pitchFamily="34" charset="0"/>
+        <a:buFont typeface="Arial" panose="020B0604020202020204" pitchFamily="34" charset="0"/>
         <a:buChar char="•"/>
-        <a:defRPr sz="2000" kern="1200">
+        <a:defRPr sz="1800" kern="1200">
           <a:solidFill>
             <a:schemeClr val="tx1"/>
           </a:solidFill>
@@ -2959,7 +3231,7 @@
     </p:bodyStyle>
     <p:otherStyle>
       <a:defPPr>
-        <a:defRPr lang="en-US"/>
+        <a:defRPr lang="pt-BR"/>
       </a:defPPr>
       <a:lvl1pPr marL="0" algn="l" defTabSz="914400" rtl="0" eaLnBrk="1" latinLnBrk="0" hangingPunct="1">
         <a:defRPr sz="1800" kern="1200">
@@ -3057,15 +3329,8 @@
 </file>
 
 <file path=ppt/slides/slide1.xml><?xml version="1.0" encoding="utf-8"?>
-<p:sld xmlns:p="http://schemas.openxmlformats.org/presentationml/2006/main" xmlns:a="http://schemas.openxmlformats.org/drawingml/2006/main">
+<p:sld xmlns:a="http://schemas.openxmlformats.org/drawingml/2006/main" xmlns:r="http://schemas.openxmlformats.org/officeDocument/2006/relationships" xmlns:p="http://schemas.openxmlformats.org/presentationml/2006/main">
   <p:cSld>
-    <p:bg>
-      <p:bgPr>
-        <a:solidFill>
-          <a:srgbClr val="F4F4F4"/>
-        </a:solidFill>
-      </p:bgPr>
-    </p:bg>
     <p:spTree>
       <p:nvGrpSpPr>
         <p:cNvPr id="1" name=""/>
@@ -3082,189 +3347,176 @@
       </p:grpSpPr>
       <p:sp>
         <p:nvSpPr>
-          <p:cNvPr name="TextBox 2" id="2"/>
-          <p:cNvSpPr txBox="true"/>
+          <p:cNvPr id="4" name="TextBox 3">
+            <a:extLst>
+              <a:ext uri="{FF2B5EF4-FFF2-40B4-BE49-F238E27FC236}">
+                <a16:creationId xmlns:a16="http://schemas.microsoft.com/office/drawing/2014/main" id="{80053EA1-B232-E5DB-1D65-C811AEE93E23}"/>
+              </a:ext>
+            </a:extLst>
+          </p:cNvPr>
+          <p:cNvSpPr txBox="1"/>
           <p:nvPr/>
         </p:nvSpPr>
         <p:spPr>
-          <a:xfrm rot="0">
-            <a:off x="1241698" y="3825891"/>
-            <a:ext cx="15804604" cy="2501867"/>
+          <a:xfrm>
+            <a:off x="3499757" y="217714"/>
+            <a:ext cx="5192486" cy="923330"/>
           </a:xfrm>
           <a:prstGeom prst="rect">
             <a:avLst/>
           </a:prstGeom>
+          <a:noFill/>
         </p:spPr>
         <p:txBody>
-          <a:bodyPr anchor="t" rtlCol="false" tIns="0" lIns="0" bIns="0" rIns="0">
+          <a:bodyPr wrap="square" rtlCol="0">
             <a:spAutoFit/>
           </a:bodyPr>
           <a:lstStyle/>
           <a:p>
-            <a:pPr algn="ctr">
-              <a:lnSpc>
-                <a:spcPts val="9994"/>
-              </a:lnSpc>
-            </a:pPr>
-            <a:r>
-              <a:rPr lang="en-US" sz="7138" spc="199">
-                <a:solidFill>
-                  <a:srgbClr val="404040"/>
-                </a:solidFill>
-                <a:latin typeface="Now Bold"/>
-              </a:rPr>
-              <a:t>MONITORAÇÃO DE BIBLIOTECAS ESCOLARES PÚBLICAS</a:t>
-            </a:r>
-          </a:p>
-        </p:txBody>
-      </p:sp>
-      <p:sp>
-        <p:nvSpPr>
-          <p:cNvPr name="TextBox 3" id="3"/>
-          <p:cNvSpPr txBox="true"/>
+            <a:pPr algn="ctr"/>
+            <a:r>
+              <a:rPr lang="pt-BR" dirty="0"/>
+              <a:t>UNIVERSIDADE CATÓLICA DE PERNAMBUCO</a:t>
+            </a:r>
+          </a:p>
+          <a:p>
+            <a:pPr algn="ctr"/>
+            <a:r>
+              <a:rPr lang="pt-BR" dirty="0"/>
+              <a:t>SISTEMAS PARA INTERNET</a:t>
+            </a:r>
+          </a:p>
+          <a:p>
+            <a:pPr algn="ctr"/>
+            <a:r>
+              <a:rPr lang="pt-BR" dirty="0"/>
+              <a:t>Banco de Dados</a:t>
+            </a:r>
+          </a:p>
+        </p:txBody>
+      </p:sp>
+      <p:sp>
+        <p:nvSpPr>
+          <p:cNvPr id="5" name="TextBox 4">
+            <a:extLst>
+              <a:ext uri="{FF2B5EF4-FFF2-40B4-BE49-F238E27FC236}">
+                <a16:creationId xmlns:a16="http://schemas.microsoft.com/office/drawing/2014/main" id="{29F1F84E-0A17-ADFE-AA28-F370577EE6F2}"/>
+              </a:ext>
+            </a:extLst>
+          </p:cNvPr>
+          <p:cNvSpPr txBox="1"/>
           <p:nvPr/>
         </p:nvSpPr>
         <p:spPr>
-          <a:xfrm rot="0">
-            <a:off x="6913320" y="6646549"/>
-            <a:ext cx="4461361" cy="355930"/>
+          <a:xfrm>
+            <a:off x="1450521" y="2275115"/>
+            <a:ext cx="9290957" cy="1569660"/>
           </a:xfrm>
           <a:prstGeom prst="rect">
             <a:avLst/>
           </a:prstGeom>
+          <a:noFill/>
         </p:spPr>
         <p:txBody>
-          <a:bodyPr anchor="t" rtlCol="false" tIns="0" lIns="0" bIns="0" rIns="0">
+          <a:bodyPr wrap="square" rtlCol="0">
             <a:spAutoFit/>
           </a:bodyPr>
           <a:lstStyle/>
           <a:p>
-            <a:pPr algn="ctr">
-              <a:lnSpc>
-                <a:spcPts val="2891"/>
-              </a:lnSpc>
-            </a:pPr>
-            <a:r>
-              <a:rPr lang="en-US" sz="2370">
-                <a:solidFill>
-                  <a:srgbClr val="000000"/>
-                </a:solidFill>
-                <a:latin typeface="Now"/>
-              </a:rPr>
-              <a:t>Modelo conceitual e físico</a:t>
-            </a:r>
-          </a:p>
-        </p:txBody>
-      </p:sp>
-      <p:sp>
-        <p:nvSpPr>
-          <p:cNvPr name="TextBox 4" id="4"/>
-          <p:cNvSpPr txBox="true"/>
+            <a:pPr algn="ctr"/>
+            <a:r>
+              <a:rPr lang="pt-BR" sz="4800" dirty="0"/>
+              <a:t>MONITORAÇÃO DE BIBLIOTECAS ESCOLARES PÚBLICAS</a:t>
+            </a:r>
+          </a:p>
+        </p:txBody>
+      </p:sp>
+      <p:sp>
+        <p:nvSpPr>
+          <p:cNvPr id="6" name="TextBox 5">
+            <a:extLst>
+              <a:ext uri="{FF2B5EF4-FFF2-40B4-BE49-F238E27FC236}">
+                <a16:creationId xmlns:a16="http://schemas.microsoft.com/office/drawing/2014/main" id="{197608EB-FF5C-09E9-239B-7A2F9D62DF37}"/>
+              </a:ext>
+            </a:extLst>
+          </p:cNvPr>
+          <p:cNvSpPr txBox="1"/>
           <p:nvPr/>
         </p:nvSpPr>
         <p:spPr>
-          <a:xfrm rot="0">
-            <a:off x="5828935" y="672770"/>
-            <a:ext cx="6630130" cy="1079830"/>
+          <a:xfrm>
+            <a:off x="4618263" y="4169229"/>
+            <a:ext cx="2955473" cy="369332"/>
           </a:xfrm>
           <a:prstGeom prst="rect">
             <a:avLst/>
           </a:prstGeom>
+          <a:noFill/>
         </p:spPr>
         <p:txBody>
-          <a:bodyPr anchor="t" rtlCol="false" tIns="0" lIns="0" bIns="0" rIns="0">
+          <a:bodyPr wrap="square" rtlCol="0">
             <a:spAutoFit/>
           </a:bodyPr>
           <a:lstStyle/>
           <a:p>
-            <a:pPr algn="ctr">
-              <a:lnSpc>
-                <a:spcPts val="2891"/>
-              </a:lnSpc>
-            </a:pPr>
-            <a:r>
-              <a:rPr lang="en-US" sz="2370">
-                <a:solidFill>
-                  <a:srgbClr val="000000"/>
-                </a:solidFill>
-                <a:latin typeface="Now"/>
-              </a:rPr>
-              <a:t>UNIVERSIDADE CATÓLICA DE PERNAMBUCO</a:t>
-            </a:r>
-          </a:p>
-          <a:p>
-            <a:pPr algn="ctr">
-              <a:lnSpc>
-                <a:spcPts val="2891"/>
-              </a:lnSpc>
-            </a:pPr>
-            <a:r>
-              <a:rPr lang="en-US" sz="2370">
-                <a:solidFill>
-                  <a:srgbClr val="000000"/>
-                </a:solidFill>
-                <a:latin typeface="Now"/>
-              </a:rPr>
-              <a:t>SISTEMAS PARA INTERNET</a:t>
-            </a:r>
-          </a:p>
-          <a:p>
-            <a:pPr algn="ctr">
-              <a:lnSpc>
-                <a:spcPts val="2891"/>
-              </a:lnSpc>
-            </a:pPr>
-            <a:r>
-              <a:rPr lang="en-US" sz="2370">
-                <a:solidFill>
-                  <a:srgbClr val="000000"/>
-                </a:solidFill>
-                <a:latin typeface="Now"/>
-              </a:rPr>
-              <a:t>Banco de Dados</a:t>
-            </a:r>
-          </a:p>
-        </p:txBody>
-      </p:sp>
-      <p:sp>
-        <p:nvSpPr>
-          <p:cNvPr name="TextBox 5" id="5"/>
-          <p:cNvSpPr txBox="true"/>
+            <a:pPr algn="ctr"/>
+            <a:r>
+              <a:rPr lang="pt-BR" dirty="0"/>
+              <a:t>Modelo conceitual e físico</a:t>
+            </a:r>
+          </a:p>
+        </p:txBody>
+      </p:sp>
+      <p:sp>
+        <p:nvSpPr>
+          <p:cNvPr id="7" name="TextBox 6">
+            <a:extLst>
+              <a:ext uri="{FF2B5EF4-FFF2-40B4-BE49-F238E27FC236}">
+                <a16:creationId xmlns:a16="http://schemas.microsoft.com/office/drawing/2014/main" id="{753B1591-4DE3-979E-A4B6-6D73A7F9C56A}"/>
+              </a:ext>
+            </a:extLst>
+          </p:cNvPr>
+          <p:cNvSpPr txBox="1"/>
           <p:nvPr/>
         </p:nvSpPr>
         <p:spPr>
-          <a:xfrm rot="0">
-            <a:off x="4627320" y="8902370"/>
-            <a:ext cx="9033361" cy="355930"/>
+          <a:xfrm>
+            <a:off x="3147330" y="6041571"/>
+            <a:ext cx="5897337" cy="369332"/>
           </a:xfrm>
           <a:prstGeom prst="rect">
             <a:avLst/>
           </a:prstGeom>
+          <a:noFill/>
         </p:spPr>
         <p:txBody>
-          <a:bodyPr anchor="t" rtlCol="false" tIns="0" lIns="0" bIns="0" rIns="0">
+          <a:bodyPr wrap="square" rtlCol="0">
             <a:spAutoFit/>
           </a:bodyPr>
           <a:lstStyle/>
           <a:p>
-            <a:pPr algn="ctr">
-              <a:lnSpc>
-                <a:spcPts val="2891"/>
-              </a:lnSpc>
-            </a:pPr>
-            <a:r>
-              <a:rPr lang="en-US" sz="2370">
-                <a:solidFill>
-                  <a:srgbClr val="000000"/>
-                </a:solidFill>
-                <a:latin typeface="Now"/>
-              </a:rPr>
-              <a:t>Discentes: Joana Falcão, Joyce Barbosa e Gustavo da Silva</a:t>
+            <a:pPr algn="ctr"/>
+            <a:r>
+              <a:rPr lang="pt-BR" dirty="0"/>
+              <a:t>Discentes: Joana Falcão, Joyce </a:t>
+            </a:r>
+            <a:r>
+              <a:rPr lang="pt-BR" dirty="0" err="1"/>
+              <a:t>Barboa</a:t>
+            </a:r>
+            <a:r>
+              <a:rPr lang="pt-BR" dirty="0"/>
+              <a:t> e Gustavo Pinto</a:t>
             </a:r>
           </a:p>
         </p:txBody>
       </p:sp>
     </p:spTree>
+    <p:extLst>
+      <p:ext uri="{BB962C8B-B14F-4D97-AF65-F5344CB8AC3E}">
+        <p14:creationId xmlns:p14="http://schemas.microsoft.com/office/powerpoint/2010/main" val="3198963108"/>
+      </p:ext>
+    </p:extLst>
   </p:cSld>
   <p:clrMapOvr>
     <a:masterClrMapping/>
@@ -3273,15 +3525,8 @@
 </file>
 
 <file path=ppt/slides/slide2.xml><?xml version="1.0" encoding="utf-8"?>
-<p:sld xmlns:p="http://schemas.openxmlformats.org/presentationml/2006/main" xmlns:a="http://schemas.openxmlformats.org/drawingml/2006/main" xmlns:r="http://schemas.openxmlformats.org/officeDocument/2006/relationships">
+<p:sld xmlns:a="http://schemas.openxmlformats.org/drawingml/2006/main" xmlns:r="http://schemas.openxmlformats.org/officeDocument/2006/relationships" xmlns:p="http://schemas.openxmlformats.org/presentationml/2006/main">
   <p:cSld>
-    <p:bg>
-      <p:bgPr>
-        <a:solidFill>
-          <a:srgbClr val="F4F4F4"/>
-        </a:solidFill>
-      </p:bgPr>
-    </p:bg>
     <p:spTree>
       <p:nvGrpSpPr>
         <p:cNvPr id="1" name=""/>
@@ -3298,89 +3543,82 @@
       </p:grpSpPr>
       <p:sp>
         <p:nvSpPr>
-          <p:cNvPr name="Freeform 2" id="2"/>
-          <p:cNvSpPr/>
+          <p:cNvPr id="2" name="TextBox 1">
+            <a:extLst>
+              <a:ext uri="{FF2B5EF4-FFF2-40B4-BE49-F238E27FC236}">
+                <a16:creationId xmlns:a16="http://schemas.microsoft.com/office/drawing/2014/main" id="{61A6C723-D8BB-95EA-0185-2CA4A8F23F68}"/>
+              </a:ext>
+            </a:extLst>
+          </p:cNvPr>
+          <p:cNvSpPr txBox="1"/>
           <p:nvPr/>
         </p:nvSpPr>
         <p:spPr>
-          <a:xfrm flipH="false" flipV="false" rot="0">
-            <a:off x="3205578" y="2163295"/>
-            <a:ext cx="11876845" cy="7095005"/>
+          <a:xfrm>
+            <a:off x="141514" y="522514"/>
+            <a:ext cx="2841172" cy="369332"/>
           </a:xfrm>
-          <a:custGeom>
+          <a:prstGeom prst="rect">
             <a:avLst/>
-            <a:gdLst/>
-            <a:ahLst/>
-            <a:cxnLst/>
-            <a:rect r="r" b="b" t="t" l="l"/>
-            <a:pathLst>
-              <a:path h="7095005" w="11876845">
-                <a:moveTo>
-                  <a:pt x="0" y="0"/>
-                </a:moveTo>
-                <a:lnTo>
-                  <a:pt x="11876844" y="0"/>
-                </a:lnTo>
-                <a:lnTo>
-                  <a:pt x="11876844" y="7095005"/>
-                </a:lnTo>
-                <a:lnTo>
-                  <a:pt x="0" y="7095005"/>
-                </a:lnTo>
-                <a:lnTo>
-                  <a:pt x="0" y="0"/>
-                </a:lnTo>
-                <a:close/>
-              </a:path>
-            </a:pathLst>
-          </a:custGeom>
-          <a:blipFill>
-            <a:blip r:embed="rId2"/>
-            <a:stretch>
-              <a:fillRect l="0" t="0" r="0" b="0"/>
-            </a:stretch>
-          </a:blipFill>
+          </a:prstGeom>
+          <a:noFill/>
         </p:spPr>
-      </p:sp>
-      <p:sp>
-        <p:nvSpPr>
-          <p:cNvPr name="TextBox 3" id="3"/>
-          <p:cNvSpPr txBox="true"/>
+        <p:txBody>
+          <a:bodyPr wrap="square" rtlCol="0">
+            <a:spAutoFit/>
+          </a:bodyPr>
+          <a:lstStyle/>
+          <a:p>
+            <a:pPr algn="ctr"/>
+            <a:r>
+              <a:rPr lang="pt-BR" dirty="0"/>
+              <a:t>MODELO CONCEITUAL</a:t>
+            </a:r>
+          </a:p>
+        </p:txBody>
+      </p:sp>
+      <p:pic>
+        <p:nvPicPr>
+          <p:cNvPr id="4" name="Picture 3" descr="A diagram of a computer&#10;&#10;Description automatically generated">
+            <a:extLst>
+              <a:ext uri="{FF2B5EF4-FFF2-40B4-BE49-F238E27FC236}">
+                <a16:creationId xmlns:a16="http://schemas.microsoft.com/office/drawing/2014/main" id="{5493317E-9FE7-CA11-B73D-B787EBC3DFFE}"/>
+              </a:ext>
+            </a:extLst>
+          </p:cNvPr>
+          <p:cNvPicPr>
+            <a:picLocks noChangeAspect="1"/>
+          </p:cNvPicPr>
           <p:nvPr/>
-        </p:nvSpPr>
+        </p:nvPicPr>
+        <p:blipFill>
+          <a:blip r:embed="rId2">
+            <a:extLst>
+              <a:ext uri="{28A0092B-C50C-407E-A947-70E740481C1C}">
+                <a14:useLocalDpi xmlns:a14="http://schemas.microsoft.com/office/drawing/2010/main" val="0"/>
+              </a:ext>
+            </a:extLst>
+          </a:blip>
+          <a:stretch>
+            <a:fillRect/>
+          </a:stretch>
+        </p:blipFill>
         <p:spPr>
-          <a:xfrm rot="0">
-            <a:off x="1028700" y="942975"/>
-            <a:ext cx="6357924" cy="688975"/>
+          <a:xfrm>
+            <a:off x="478972" y="1291288"/>
+            <a:ext cx="11453127" cy="4957112"/>
           </a:xfrm>
           <a:prstGeom prst="rect">
             <a:avLst/>
           </a:prstGeom>
         </p:spPr>
-        <p:txBody>
-          <a:bodyPr anchor="t" rtlCol="false" tIns="0" lIns="0" bIns="0" rIns="0">
-            <a:spAutoFit/>
-          </a:bodyPr>
-          <a:lstStyle/>
-          <a:p>
-            <a:pPr algn="ctr">
-              <a:lnSpc>
-                <a:spcPts val="5599"/>
-              </a:lnSpc>
-            </a:pPr>
-            <a:r>
-              <a:rPr lang="en-US" sz="3999" spc="111">
-                <a:solidFill>
-                  <a:srgbClr val="404040"/>
-                </a:solidFill>
-                <a:latin typeface="Now Bold"/>
-              </a:rPr>
-              <a:t>MODELO CONCEITUAL</a:t>
-            </a:r>
-          </a:p>
-        </p:txBody>
-      </p:sp>
+      </p:pic>
     </p:spTree>
+    <p:extLst>
+      <p:ext uri="{BB962C8B-B14F-4D97-AF65-F5344CB8AC3E}">
+        <p14:creationId xmlns:p14="http://schemas.microsoft.com/office/powerpoint/2010/main" val="2169743221"/>
+      </p:ext>
+    </p:extLst>
   </p:cSld>
   <p:clrMapOvr>
     <a:masterClrMapping/>
@@ -3389,15 +3627,8 @@
 </file>
 
 <file path=ppt/slides/slide3.xml><?xml version="1.0" encoding="utf-8"?>
-<p:sld xmlns:p="http://schemas.openxmlformats.org/presentationml/2006/main" xmlns:a="http://schemas.openxmlformats.org/drawingml/2006/main" xmlns:r="http://schemas.openxmlformats.org/officeDocument/2006/relationships">
+<p:sld xmlns:a="http://schemas.openxmlformats.org/drawingml/2006/main" xmlns:r="http://schemas.openxmlformats.org/officeDocument/2006/relationships" xmlns:p="http://schemas.openxmlformats.org/presentationml/2006/main">
   <p:cSld>
-    <p:bg>
-      <p:bgPr>
-        <a:solidFill>
-          <a:srgbClr val="F4F4F4"/>
-        </a:solidFill>
-      </p:bgPr>
-    </p:bg>
     <p:spTree>
       <p:nvGrpSpPr>
         <p:cNvPr id="1" name=""/>
@@ -3414,89 +3645,106 @@
       </p:grpSpPr>
       <p:sp>
         <p:nvSpPr>
-          <p:cNvPr name="Freeform 2" id="2"/>
-          <p:cNvSpPr/>
+          <p:cNvPr id="2" name="TextBox 1">
+            <a:extLst>
+              <a:ext uri="{FF2B5EF4-FFF2-40B4-BE49-F238E27FC236}">
+                <a16:creationId xmlns:a16="http://schemas.microsoft.com/office/drawing/2014/main" id="{61A6C723-D8BB-95EA-0185-2CA4A8F23F68}"/>
+              </a:ext>
+            </a:extLst>
+          </p:cNvPr>
+          <p:cNvSpPr txBox="1"/>
           <p:nvPr/>
         </p:nvSpPr>
         <p:spPr>
-          <a:xfrm flipH="false" flipV="false" rot="0">
-            <a:off x="1261966" y="2654277"/>
-            <a:ext cx="15764068" cy="5822569"/>
+          <a:xfrm>
+            <a:off x="141514" y="522514"/>
+            <a:ext cx="1926772" cy="369332"/>
           </a:xfrm>
-          <a:custGeom>
+          <a:prstGeom prst="rect">
             <a:avLst/>
-            <a:gdLst/>
-            <a:ahLst/>
-            <a:cxnLst/>
-            <a:rect r="r" b="b" t="t" l="l"/>
-            <a:pathLst>
-              <a:path h="5822569" w="15764068">
-                <a:moveTo>
-                  <a:pt x="0" y="0"/>
-                </a:moveTo>
-                <a:lnTo>
-                  <a:pt x="15764068" y="0"/>
-                </a:lnTo>
-                <a:lnTo>
-                  <a:pt x="15764068" y="5822570"/>
-                </a:lnTo>
-                <a:lnTo>
-                  <a:pt x="0" y="5822570"/>
-                </a:lnTo>
-                <a:lnTo>
-                  <a:pt x="0" y="0"/>
-                </a:lnTo>
-                <a:close/>
-              </a:path>
-            </a:pathLst>
-          </a:custGeom>
-          <a:blipFill>
-            <a:blip r:embed="rId2"/>
-            <a:stretch>
-              <a:fillRect l="0" t="0" r="0" b="0"/>
-            </a:stretch>
-          </a:blipFill>
+          </a:prstGeom>
+          <a:noFill/>
         </p:spPr>
-      </p:sp>
-      <p:sp>
-        <p:nvSpPr>
-          <p:cNvPr name="TextBox 3" id="3"/>
-          <p:cNvSpPr txBox="true"/>
+        <p:txBody>
+          <a:bodyPr wrap="square" rtlCol="0">
+            <a:spAutoFit/>
+          </a:bodyPr>
+          <a:lstStyle/>
+          <a:p>
+            <a:pPr algn="ctr"/>
+            <a:r>
+              <a:rPr lang="pt-BR" dirty="0"/>
+              <a:t>MODELO FÍSICO</a:t>
+            </a:r>
+          </a:p>
+        </p:txBody>
+      </p:sp>
+      <p:pic>
+        <p:nvPicPr>
+          <p:cNvPr id="5" name="Picture 4">
+            <a:extLst>
+              <a:ext uri="{FF2B5EF4-FFF2-40B4-BE49-F238E27FC236}">
+                <a16:creationId xmlns:a16="http://schemas.microsoft.com/office/drawing/2014/main" id="{F45D49B7-6F8F-71F1-540B-DA8334E5BE45}"/>
+              </a:ext>
+            </a:extLst>
+          </p:cNvPr>
+          <p:cNvPicPr>
+            <a:picLocks noChangeAspect="1"/>
+          </p:cNvPicPr>
           <p:nvPr/>
-        </p:nvSpPr>
+        </p:nvPicPr>
+        <p:blipFill>
+          <a:blip r:embed="rId2"/>
+          <a:stretch>
+            <a:fillRect/>
+          </a:stretch>
+        </p:blipFill>
         <p:spPr>
-          <a:xfrm rot="0">
-            <a:off x="1028700" y="942975"/>
-            <a:ext cx="4702517" cy="688975"/>
+          <a:xfrm>
+            <a:off x="750120" y="1305584"/>
+            <a:ext cx="4486901" cy="5029902"/>
           </a:xfrm>
           <a:prstGeom prst="rect">
             <a:avLst/>
           </a:prstGeom>
         </p:spPr>
-        <p:txBody>
-          <a:bodyPr anchor="t" rtlCol="false" tIns="0" lIns="0" bIns="0" rIns="0">
-            <a:spAutoFit/>
-          </a:bodyPr>
-          <a:lstStyle/>
-          <a:p>
-            <a:pPr algn="ctr">
-              <a:lnSpc>
-                <a:spcPts val="5599"/>
-              </a:lnSpc>
-            </a:pPr>
-            <a:r>
-              <a:rPr lang="en-US" sz="3999" spc="111">
-                <a:solidFill>
-                  <a:srgbClr val="404040"/>
-                </a:solidFill>
-                <a:latin typeface="Now Bold"/>
-              </a:rPr>
-              <a:t>MODELO FÍSICO</a:t>
-            </a:r>
-          </a:p>
-        </p:txBody>
-      </p:sp>
+      </p:pic>
+      <p:pic>
+        <p:nvPicPr>
+          <p:cNvPr id="7" name="Picture 6">
+            <a:extLst>
+              <a:ext uri="{FF2B5EF4-FFF2-40B4-BE49-F238E27FC236}">
+                <a16:creationId xmlns:a16="http://schemas.microsoft.com/office/drawing/2014/main" id="{A42D75A5-536C-3D5B-9C46-1B22CB6ADD1B}"/>
+              </a:ext>
+            </a:extLst>
+          </p:cNvPr>
+          <p:cNvPicPr>
+            <a:picLocks noChangeAspect="1"/>
+          </p:cNvPicPr>
+          <p:nvPr/>
+        </p:nvPicPr>
+        <p:blipFill>
+          <a:blip r:embed="rId3"/>
+          <a:stretch>
+            <a:fillRect/>
+          </a:stretch>
+        </p:blipFill>
+        <p:spPr>
+          <a:xfrm>
+            <a:off x="5432905" y="522514"/>
+            <a:ext cx="6115904" cy="6173061"/>
+          </a:xfrm>
+          <a:prstGeom prst="rect">
+            <a:avLst/>
+          </a:prstGeom>
+        </p:spPr>
+      </p:pic>
     </p:spTree>
+    <p:extLst>
+      <p:ext uri="{BB962C8B-B14F-4D97-AF65-F5344CB8AC3E}">
+        <p14:creationId xmlns:p14="http://schemas.microsoft.com/office/powerpoint/2010/main" val="3064840370"/>
+      </p:ext>
+    </p:extLst>
   </p:cSld>
   <p:clrMapOvr>
     <a:masterClrMapping/>
@@ -3505,15 +3753,8 @@
 </file>
 
 <file path=ppt/slides/slide4.xml><?xml version="1.0" encoding="utf-8"?>
-<p:sld xmlns:p="http://schemas.openxmlformats.org/presentationml/2006/main" xmlns:a="http://schemas.openxmlformats.org/drawingml/2006/main" xmlns:r="http://schemas.openxmlformats.org/officeDocument/2006/relationships">
+<p:sld xmlns:a="http://schemas.openxmlformats.org/drawingml/2006/main" xmlns:r="http://schemas.openxmlformats.org/officeDocument/2006/relationships" xmlns:p="http://schemas.openxmlformats.org/presentationml/2006/main">
   <p:cSld>
-    <p:bg>
-      <p:bgPr>
-        <a:solidFill>
-          <a:srgbClr val="F4F4F4"/>
-        </a:solidFill>
-      </p:bgPr>
-    </p:bg>
     <p:spTree>
       <p:nvGrpSpPr>
         <p:cNvPr id="1" name=""/>
@@ -3530,205 +3771,106 @@
       </p:grpSpPr>
       <p:sp>
         <p:nvSpPr>
-          <p:cNvPr name="Freeform 2" id="2"/>
-          <p:cNvSpPr/>
+          <p:cNvPr id="2" name="TextBox 1">
+            <a:extLst>
+              <a:ext uri="{FF2B5EF4-FFF2-40B4-BE49-F238E27FC236}">
+                <a16:creationId xmlns:a16="http://schemas.microsoft.com/office/drawing/2014/main" id="{61A6C723-D8BB-95EA-0185-2CA4A8F23F68}"/>
+              </a:ext>
+            </a:extLst>
+          </p:cNvPr>
+          <p:cNvSpPr txBox="1"/>
           <p:nvPr/>
         </p:nvSpPr>
         <p:spPr>
-          <a:xfrm flipH="false" flipV="false" rot="0">
-            <a:off x="2768960" y="1985758"/>
-            <a:ext cx="12750080" cy="7272542"/>
+          <a:xfrm>
+            <a:off x="141514" y="522514"/>
+            <a:ext cx="1926772" cy="369332"/>
           </a:xfrm>
-          <a:custGeom>
+          <a:prstGeom prst="rect">
             <a:avLst/>
-            <a:gdLst/>
-            <a:ahLst/>
-            <a:cxnLst/>
-            <a:rect r="r" b="b" t="t" l="l"/>
-            <a:pathLst>
-              <a:path h="7272542" w="12750080">
-                <a:moveTo>
-                  <a:pt x="0" y="0"/>
-                </a:moveTo>
-                <a:lnTo>
-                  <a:pt x="12750080" y="0"/>
-                </a:lnTo>
-                <a:lnTo>
-                  <a:pt x="12750080" y="7272542"/>
-                </a:lnTo>
-                <a:lnTo>
-                  <a:pt x="0" y="7272542"/>
-                </a:lnTo>
-                <a:lnTo>
-                  <a:pt x="0" y="0"/>
-                </a:lnTo>
-                <a:close/>
-              </a:path>
-            </a:pathLst>
-          </a:custGeom>
-          <a:blipFill>
-            <a:blip r:embed="rId2"/>
-            <a:stretch>
-              <a:fillRect l="0" t="0" r="0" b="0"/>
-            </a:stretch>
-          </a:blipFill>
+          </a:prstGeom>
+          <a:noFill/>
         </p:spPr>
-      </p:sp>
-      <p:sp>
-        <p:nvSpPr>
-          <p:cNvPr name="TextBox 3" id="3"/>
-          <p:cNvSpPr txBox="true"/>
+        <p:txBody>
+          <a:bodyPr wrap="square" rtlCol="0">
+            <a:spAutoFit/>
+          </a:bodyPr>
+          <a:lstStyle/>
+          <a:p>
+            <a:pPr algn="ctr"/>
+            <a:r>
+              <a:rPr lang="pt-BR" dirty="0"/>
+              <a:t>MODELO FÍSICO</a:t>
+            </a:r>
+          </a:p>
+        </p:txBody>
+      </p:sp>
+      <p:pic>
+        <p:nvPicPr>
+          <p:cNvPr id="4" name="Picture 3">
+            <a:extLst>
+              <a:ext uri="{FF2B5EF4-FFF2-40B4-BE49-F238E27FC236}">
+                <a16:creationId xmlns:a16="http://schemas.microsoft.com/office/drawing/2014/main" id="{9A456044-F2F3-E564-6E7A-BDD589A2A946}"/>
+              </a:ext>
+            </a:extLst>
+          </p:cNvPr>
+          <p:cNvPicPr>
+            <a:picLocks noChangeAspect="1"/>
+          </p:cNvPicPr>
           <p:nvPr/>
-        </p:nvSpPr>
+        </p:nvPicPr>
+        <p:blipFill>
+          <a:blip r:embed="rId2"/>
+          <a:stretch>
+            <a:fillRect/>
+          </a:stretch>
+        </p:blipFill>
         <p:spPr>
-          <a:xfrm rot="0">
-            <a:off x="1028700" y="942975"/>
-            <a:ext cx="4702517" cy="688975"/>
+          <a:xfrm>
+            <a:off x="499626" y="1405308"/>
+            <a:ext cx="5906324" cy="4439270"/>
           </a:xfrm>
           <a:prstGeom prst="rect">
             <a:avLst/>
           </a:prstGeom>
         </p:spPr>
-        <p:txBody>
-          <a:bodyPr anchor="t" rtlCol="false" tIns="0" lIns="0" bIns="0" rIns="0">
-            <a:spAutoFit/>
-          </a:bodyPr>
-          <a:lstStyle/>
-          <a:p>
-            <a:pPr algn="ctr">
-              <a:lnSpc>
-                <a:spcPts val="5599"/>
-              </a:lnSpc>
-            </a:pPr>
-            <a:r>
-              <a:rPr lang="en-US" sz="3999" spc="111">
-                <a:solidFill>
-                  <a:srgbClr val="404040"/>
-                </a:solidFill>
-                <a:latin typeface="Now Bold"/>
-              </a:rPr>
-              <a:t>MODELO FÍSICO</a:t>
-            </a:r>
-          </a:p>
-        </p:txBody>
-      </p:sp>
-    </p:spTree>
-  </p:cSld>
-  <p:clrMapOvr>
-    <a:masterClrMapping/>
-  </p:clrMapOvr>
-</p:sld>
-</file>
-
-<file path=ppt/slides/slide5.xml><?xml version="1.0" encoding="utf-8"?>
-<p:sld xmlns:p="http://schemas.openxmlformats.org/presentationml/2006/main" xmlns:a="http://schemas.openxmlformats.org/drawingml/2006/main" xmlns:r="http://schemas.openxmlformats.org/officeDocument/2006/relationships">
-  <p:cSld>
-    <p:bg>
-      <p:bgPr>
-        <a:solidFill>
-          <a:srgbClr val="F4F4F4"/>
-        </a:solidFill>
-      </p:bgPr>
-    </p:bg>
-    <p:spTree>
-      <p:nvGrpSpPr>
-        <p:cNvPr id="1" name=""/>
-        <p:cNvGrpSpPr/>
-        <p:nvPr/>
-      </p:nvGrpSpPr>
-      <p:grpSpPr>
-        <a:xfrm>
-          <a:off x="0" y="0"/>
-          <a:ext cx="0" cy="0"/>
-          <a:chOff x="0" y="0"/>
-          <a:chExt cx="0" cy="0"/>
-        </a:xfrm>
-      </p:grpSpPr>
-      <p:sp>
-        <p:nvSpPr>
-          <p:cNvPr name="Freeform 2" id="2"/>
-          <p:cNvSpPr/>
+      </p:pic>
+      <p:pic>
+        <p:nvPicPr>
+          <p:cNvPr id="8" name="Picture 7">
+            <a:extLst>
+              <a:ext uri="{FF2B5EF4-FFF2-40B4-BE49-F238E27FC236}">
+                <a16:creationId xmlns:a16="http://schemas.microsoft.com/office/drawing/2014/main" id="{31F5F97C-8D27-207B-E116-33544805F594}"/>
+              </a:ext>
+            </a:extLst>
+          </p:cNvPr>
+          <p:cNvPicPr>
+            <a:picLocks noChangeAspect="1"/>
+          </p:cNvPicPr>
           <p:nvPr/>
-        </p:nvSpPr>
+        </p:nvPicPr>
+        <p:blipFill>
+          <a:blip r:embed="rId3"/>
+          <a:stretch>
+            <a:fillRect/>
+          </a:stretch>
+        </p:blipFill>
         <p:spPr>
-          <a:xfrm flipH="false" flipV="false" rot="0">
-            <a:off x="4531257" y="1842766"/>
-            <a:ext cx="9225486" cy="7415534"/>
-          </a:xfrm>
-          <a:custGeom>
-            <a:avLst/>
-            <a:gdLst/>
-            <a:ahLst/>
-            <a:cxnLst/>
-            <a:rect r="r" b="b" t="t" l="l"/>
-            <a:pathLst>
-              <a:path h="7415534" w="9225486">
-                <a:moveTo>
-                  <a:pt x="0" y="0"/>
-                </a:moveTo>
-                <a:lnTo>
-                  <a:pt x="9225486" y="0"/>
-                </a:lnTo>
-                <a:lnTo>
-                  <a:pt x="9225486" y="7415534"/>
-                </a:lnTo>
-                <a:lnTo>
-                  <a:pt x="0" y="7415534"/>
-                </a:lnTo>
-                <a:lnTo>
-                  <a:pt x="0" y="0"/>
-                </a:lnTo>
-                <a:close/>
-              </a:path>
-            </a:pathLst>
-          </a:custGeom>
-          <a:blipFill>
-            <a:blip r:embed="rId2"/>
-            <a:stretch>
-              <a:fillRect l="0" t="0" r="0" b="0"/>
-            </a:stretch>
-          </a:blipFill>
-        </p:spPr>
-      </p:sp>
-      <p:sp>
-        <p:nvSpPr>
-          <p:cNvPr name="TextBox 3" id="3"/>
-          <p:cNvSpPr txBox="true"/>
-          <p:nvPr/>
-        </p:nvSpPr>
-        <p:spPr>
-          <a:xfrm rot="0">
-            <a:off x="1028700" y="942975"/>
-            <a:ext cx="4702517" cy="688975"/>
+          <a:xfrm>
+            <a:off x="6405950" y="1081413"/>
+            <a:ext cx="5048955" cy="5087060"/>
           </a:xfrm>
           <a:prstGeom prst="rect">
             <a:avLst/>
           </a:prstGeom>
         </p:spPr>
-        <p:txBody>
-          <a:bodyPr anchor="t" rtlCol="false" tIns="0" lIns="0" bIns="0" rIns="0">
-            <a:spAutoFit/>
-          </a:bodyPr>
-          <a:lstStyle/>
-          <a:p>
-            <a:pPr algn="ctr">
-              <a:lnSpc>
-                <a:spcPts val="5599"/>
-              </a:lnSpc>
-            </a:pPr>
-            <a:r>
-              <a:rPr lang="en-US" sz="3999" spc="111">
-                <a:solidFill>
-                  <a:srgbClr val="404040"/>
-                </a:solidFill>
-                <a:latin typeface="Now Bold"/>
-              </a:rPr>
-              <a:t>MODELO FÍSICO</a:t>
-            </a:r>
-          </a:p>
-        </p:txBody>
-      </p:sp>
+      </p:pic>
     </p:spTree>
+    <p:extLst>
+      <p:ext uri="{BB962C8B-B14F-4D97-AF65-F5344CB8AC3E}">
+        <p14:creationId xmlns:p14="http://schemas.microsoft.com/office/powerpoint/2010/main" val="1411967596"/>
+      </p:ext>
+    </p:extLst>
   </p:cSld>
   <p:clrMapOvr>
     <a:masterClrMapping/>
@@ -3747,44 +3889,44 @@
         <a:sysClr val="window" lastClr="FFFFFF"/>
       </a:lt1>
       <a:dk2>
-        <a:srgbClr val="1F497D"/>
+        <a:srgbClr val="0E2841"/>
       </a:dk2>
       <a:lt2>
-        <a:srgbClr val="EEECE1"/>
+        <a:srgbClr val="E8E8E8"/>
       </a:lt2>
       <a:accent1>
-        <a:srgbClr val="4F81BD"/>
+        <a:srgbClr val="156082"/>
       </a:accent1>
       <a:accent2>
-        <a:srgbClr val="C0504D"/>
+        <a:srgbClr val="E97132"/>
       </a:accent2>
       <a:accent3>
-        <a:srgbClr val="9BBB59"/>
+        <a:srgbClr val="196B24"/>
       </a:accent3>
       <a:accent4>
-        <a:srgbClr val="8064A2"/>
+        <a:srgbClr val="0F9ED5"/>
       </a:accent4>
       <a:accent5>
-        <a:srgbClr val="4BACC6"/>
+        <a:srgbClr val="A02B93"/>
       </a:accent5>
       <a:accent6>
-        <a:srgbClr val="F79646"/>
+        <a:srgbClr val="4EA72E"/>
       </a:accent6>
       <a:hlink>
-        <a:srgbClr val="0000FF"/>
+        <a:srgbClr val="467886"/>
       </a:hlink>
       <a:folHlink>
-        <a:srgbClr val="800080"/>
+        <a:srgbClr val="96607D"/>
       </a:folHlink>
     </a:clrScheme>
     <a:fontScheme name="Office">
       <a:majorFont>
-        <a:latin typeface="Calibri"/>
+        <a:latin typeface="Aptos Display" panose="02110004020202020204"/>
         <a:ea typeface=""/>
         <a:cs typeface=""/>
-        <a:font script="Jpan" typeface="ＭＳ Ｐゴシック"/>
+        <a:font script="Jpan" typeface="游ゴシック Light"/>
         <a:font script="Hang" typeface="맑은 고딕"/>
-        <a:font script="Hans" typeface="宋体"/>
+        <a:font script="Hans" typeface="等线 Light"/>
         <a:font script="Hant" typeface="新細明體"/>
         <a:font script="Arab" typeface="Times New Roman"/>
         <a:font script="Hebr" typeface="Times New Roman"/>
@@ -3811,14 +3953,32 @@
         <a:font script="Mong" typeface="Mongolian Baiti"/>
         <a:font script="Viet" typeface="Times New Roman"/>
         <a:font script="Uigh" typeface="Microsoft Uighur"/>
+        <a:font script="Geor" typeface="Sylfaen"/>
+        <a:font script="Armn" typeface="Arial"/>
+        <a:font script="Bugi" typeface="Leelawadee UI"/>
+        <a:font script="Bopo" typeface="Microsoft JhengHei"/>
+        <a:font script="Java" typeface="Javanese Text"/>
+        <a:font script="Lisu" typeface="Segoe UI"/>
+        <a:font script="Mymr" typeface="Myanmar Text"/>
+        <a:font script="Nkoo" typeface="Ebrima"/>
+        <a:font script="Olck" typeface="Nirmala UI"/>
+        <a:font script="Osma" typeface="Ebrima"/>
+        <a:font script="Phag" typeface="Phagspa"/>
+        <a:font script="Syrn" typeface="Estrangelo Edessa"/>
+        <a:font script="Syrj" typeface="Estrangelo Edessa"/>
+        <a:font script="Syre" typeface="Estrangelo Edessa"/>
+        <a:font script="Sora" typeface="Nirmala UI"/>
+        <a:font script="Tale" typeface="Microsoft Tai Le"/>
+        <a:font script="Talu" typeface="Microsoft New Tai Lue"/>
+        <a:font script="Tfng" typeface="Ebrima"/>
       </a:majorFont>
       <a:minorFont>
-        <a:latin typeface="Calibri"/>
+        <a:latin typeface="Aptos" panose="02110004020202020204"/>
         <a:ea typeface=""/>
         <a:cs typeface=""/>
-        <a:font script="Jpan" typeface="ＭＳ Ｐゴシック"/>
+        <a:font script="Jpan" typeface="游ゴシック"/>
         <a:font script="Hang" typeface="맑은 고딕"/>
-        <a:font script="Hans" typeface="宋体"/>
+        <a:font script="Hans" typeface="等线"/>
         <a:font script="Hant" typeface="新細明體"/>
         <a:font script="Arab" typeface="Arial"/>
         <a:font script="Hebr" typeface="Arial"/>
@@ -3845,6 +4005,24 @@
         <a:font script="Mong" typeface="Mongolian Baiti"/>
         <a:font script="Viet" typeface="Arial"/>
         <a:font script="Uigh" typeface="Microsoft Uighur"/>
+        <a:font script="Geor" typeface="Sylfaen"/>
+        <a:font script="Armn" typeface="Arial"/>
+        <a:font script="Bugi" typeface="Leelawadee UI"/>
+        <a:font script="Bopo" typeface="Microsoft JhengHei"/>
+        <a:font script="Java" typeface="Javanese Text"/>
+        <a:font script="Lisu" typeface="Segoe UI"/>
+        <a:font script="Mymr" typeface="Myanmar Text"/>
+        <a:font script="Nkoo" typeface="Ebrima"/>
+        <a:font script="Olck" typeface="Nirmala UI"/>
+        <a:font script="Osma" typeface="Ebrima"/>
+        <a:font script="Phag" typeface="Phagspa"/>
+        <a:font script="Syrn" typeface="Estrangelo Edessa"/>
+        <a:font script="Syrj" typeface="Estrangelo Edessa"/>
+        <a:font script="Syre" typeface="Estrangelo Edessa"/>
+        <a:font script="Sora" typeface="Nirmala UI"/>
+        <a:font script="Tale" typeface="Microsoft Tai Le"/>
+        <a:font script="Talu" typeface="Microsoft New Tai Lue"/>
+        <a:font script="Tfng" typeface="Ebrima"/>
       </a:minorFont>
     </a:fontScheme>
     <a:fmtScheme name="Office">
@@ -3856,165 +4034,161 @@
           <a:gsLst>
             <a:gs pos="0">
               <a:schemeClr val="phClr">
-                <a:tint val="50000"/>
-                <a:satMod val="300000"/>
+                <a:lumMod val="110000"/>
+                <a:satMod val="105000"/>
+                <a:tint val="67000"/>
               </a:schemeClr>
             </a:gs>
-            <a:gs pos="35000">
+            <a:gs pos="50000">
               <a:schemeClr val="phClr">
-                <a:tint val="37000"/>
-                <a:satMod val="300000"/>
+                <a:lumMod val="105000"/>
+                <a:satMod val="103000"/>
+                <a:tint val="73000"/>
               </a:schemeClr>
             </a:gs>
             <a:gs pos="100000">
               <a:schemeClr val="phClr">
-                <a:tint val="15000"/>
-                <a:satMod val="350000"/>
+                <a:lumMod val="105000"/>
+                <a:satMod val="109000"/>
+                <a:tint val="81000"/>
               </a:schemeClr>
             </a:gs>
           </a:gsLst>
-          <a:lin ang="16200000" scaled="1"/>
+          <a:lin ang="5400000" scaled="0"/>
         </a:gradFill>
         <a:gradFill rotWithShape="1">
           <a:gsLst>
             <a:gs pos="0">
               <a:schemeClr val="phClr">
-                <a:shade val="51000"/>
-                <a:satMod val="130000"/>
+                <a:satMod val="103000"/>
+                <a:lumMod val="102000"/>
+                <a:tint val="94000"/>
               </a:schemeClr>
             </a:gs>
-            <a:gs pos="80000">
+            <a:gs pos="50000">
               <a:schemeClr val="phClr">
-                <a:shade val="93000"/>
-                <a:satMod val="130000"/>
+                <a:satMod val="110000"/>
+                <a:lumMod val="100000"/>
+                <a:shade val="100000"/>
               </a:schemeClr>
             </a:gs>
             <a:gs pos="100000">
               <a:schemeClr val="phClr">
-                <a:shade val="94000"/>
-                <a:satMod val="135000"/>
+                <a:lumMod val="99000"/>
+                <a:satMod val="120000"/>
+                <a:shade val="78000"/>
               </a:schemeClr>
             </a:gs>
           </a:gsLst>
-          <a:lin ang="16200000" scaled="0"/>
+          <a:lin ang="5400000" scaled="0"/>
         </a:gradFill>
       </a:fillStyleLst>
       <a:lnStyleLst>
-        <a:ln w="9525" cap="flat" cmpd="sng" algn="ctr">
+        <a:ln w="12700" cap="flat" cmpd="sng" algn="ctr">
           <a:solidFill>
-            <a:schemeClr val="phClr">
-              <a:shade val="95000"/>
-              <a:satMod val="105000"/>
-            </a:schemeClr>
+            <a:schemeClr val="phClr"/>
           </a:solidFill>
           <a:prstDash val="solid"/>
+          <a:miter lim="800000"/>
+        </a:ln>
+        <a:ln w="19050" cap="flat" cmpd="sng" algn="ctr">
+          <a:solidFill>
+            <a:schemeClr val="phClr"/>
+          </a:solidFill>
+          <a:prstDash val="solid"/>
+          <a:miter lim="800000"/>
         </a:ln>
         <a:ln w="25400" cap="flat" cmpd="sng" algn="ctr">
           <a:solidFill>
             <a:schemeClr val="phClr"/>
           </a:solidFill>
           <a:prstDash val="solid"/>
-        </a:ln>
-        <a:ln w="38100" cap="flat" cmpd="sng" algn="ctr">
-          <a:solidFill>
-            <a:schemeClr val="phClr"/>
-          </a:solidFill>
-          <a:prstDash val="solid"/>
+          <a:miter lim="800000"/>
         </a:ln>
       </a:lnStyleLst>
       <a:effectStyleLst>
         <a:effectStyle>
+          <a:effectLst/>
+        </a:effectStyle>
+        <a:effectStyle>
+          <a:effectLst/>
+        </a:effectStyle>
+        <a:effectStyle>
           <a:effectLst>
-            <a:outerShdw blurRad="40000" dist="20000" dir="5400000" rotWithShape="0">
+            <a:outerShdw blurRad="57150" dist="19050" dir="5400000" algn="ctr" rotWithShape="0">
               <a:srgbClr val="000000">
-                <a:alpha val="38000"/>
+                <a:alpha val="63000"/>
               </a:srgbClr>
             </a:outerShdw>
           </a:effectLst>
-        </a:effectStyle>
-        <a:effectStyle>
-          <a:effectLst>
-            <a:outerShdw blurRad="40000" dist="23000" dir="5400000" rotWithShape="0">
-              <a:srgbClr val="000000">
-                <a:alpha val="35000"/>
-              </a:srgbClr>
-            </a:outerShdw>
-          </a:effectLst>
-        </a:effectStyle>
-        <a:effectStyle>
-          <a:effectLst>
-            <a:outerShdw blurRad="40000" dist="23000" dir="5400000" rotWithShape="0">
-              <a:srgbClr val="000000">
-                <a:alpha val="35000"/>
-              </a:srgbClr>
-            </a:outerShdw>
-          </a:effectLst>
-          <a:scene3d>
-            <a:camera prst="orthographicFront">
-              <a:rot lat="0" lon="0" rev="0"/>
-            </a:camera>
-            <a:lightRig rig="threePt" dir="t">
-              <a:rot lat="0" lon="0" rev="1200000"/>
-            </a:lightRig>
-          </a:scene3d>
-          <a:sp3d>
-            <a:bevelT w="63500" h="25400"/>
-          </a:sp3d>
         </a:effectStyle>
       </a:effectStyleLst>
       <a:bgFillStyleLst>
         <a:solidFill>
           <a:schemeClr val="phClr"/>
         </a:solidFill>
+        <a:solidFill>
+          <a:schemeClr val="phClr">
+            <a:tint val="95000"/>
+            <a:satMod val="170000"/>
+          </a:schemeClr>
+        </a:solidFill>
         <a:gradFill rotWithShape="1">
           <a:gsLst>
             <a:gs pos="0">
               <a:schemeClr val="phClr">
-                <a:tint val="40000"/>
-                <a:satMod val="350000"/>
+                <a:tint val="93000"/>
+                <a:satMod val="150000"/>
+                <a:shade val="98000"/>
+                <a:lumMod val="102000"/>
               </a:schemeClr>
             </a:gs>
-            <a:gs pos="40000">
+            <a:gs pos="50000">
               <a:schemeClr val="phClr">
-                <a:tint val="45000"/>
-                <a:shade val="99000"/>
-                <a:satMod val="350000"/>
+                <a:tint val="98000"/>
+                <a:satMod val="130000"/>
+                <a:shade val="90000"/>
+                <a:lumMod val="103000"/>
               </a:schemeClr>
             </a:gs>
             <a:gs pos="100000">
               <a:schemeClr val="phClr">
-                <a:shade val="20000"/>
-                <a:satMod val="255000"/>
+                <a:shade val="63000"/>
+                <a:satMod val="120000"/>
               </a:schemeClr>
             </a:gs>
           </a:gsLst>
-          <a:path path="circle">
-            <a:fillToRect l="50000" t="-80000" r="50000" b="180000"/>
-          </a:path>
-        </a:gradFill>
-        <a:gradFill rotWithShape="1">
-          <a:gsLst>
-            <a:gs pos="0">
-              <a:schemeClr val="phClr">
-                <a:tint val="80000"/>
-                <a:satMod val="300000"/>
-              </a:schemeClr>
-            </a:gs>
-            <a:gs pos="100000">
-              <a:schemeClr val="phClr">
-                <a:shade val="30000"/>
-                <a:satMod val="200000"/>
-              </a:schemeClr>
-            </a:gs>
-          </a:gsLst>
-          <a:path path="circle">
-            <a:fillToRect l="50000" t="50000" r="50000" b="50000"/>
-          </a:path>
+          <a:lin ang="5400000" scaled="0"/>
         </a:gradFill>
       </a:bgFillStyleLst>
     </a:fmtScheme>
   </a:themeElements>
-  <a:objectDefaults/>
+  <a:objectDefaults>
+    <a:lnDef>
+      <a:spPr/>
+      <a:bodyPr/>
+      <a:lstStyle/>
+      <a:style>
+        <a:lnRef idx="2">
+          <a:schemeClr val="accent1"/>
+        </a:lnRef>
+        <a:fillRef idx="0">
+          <a:schemeClr val="accent1"/>
+        </a:fillRef>
+        <a:effectRef idx="1">
+          <a:schemeClr val="accent1"/>
+        </a:effectRef>
+        <a:fontRef idx="minor">
+          <a:schemeClr val="tx1"/>
+        </a:fontRef>
+      </a:style>
+    </a:lnDef>
+  </a:objectDefaults>
   <a:extraClrSchemeLst/>
+  <a:extLst>
+    <a:ext uri="{05A4C25C-085E-4340-85A3-A5531E510DB2}">
+      <thm15:themeFamily xmlns:thm15="http://schemas.microsoft.com/office/thememl/2012/main" name="Office Theme" id="{2E142A2C-CD16-42D6-873A-C26D2A0506FA}" vid="{1BDDFF52-6CD6-40A5-AB3C-68EB2F1E4D0A}"/>
+    </a:ext>
+  </a:extLst>
 </a:theme>
 </file>
</xml_diff>